<commit_message>
May 11, 2025 update
</commit_message>
<xml_diff>
--- a/docs/images/network.pptx
+++ b/docs/images/network.pptx
@@ -7,6 +7,8 @@
   <p:sldIdLst>
     <p:sldId id="256" r:id="rId2"/>
     <p:sldId id="257" r:id="rId3"/>
+    <p:sldId id="258" r:id="rId4"/>
+    <p:sldId id="259" r:id="rId5"/>
   </p:sldIdLst>
   <p:sldSz cx="12192000" cy="6858000"/>
   <p:notesSz cx="6858000" cy="9144000"/>
@@ -105,6 +107,11 @@
       </a:defRPr>
     </a:lvl9pPr>
   </p:defaultTextStyle>
+  <p:extLst>
+    <p:ext uri="{EFAFB233-063F-42B5-8137-9DF3F51BA10A}">
+      <p15:sldGuideLst xmlns:p15="http://schemas.microsoft.com/office/powerpoint/2012/main"/>
+    </p:ext>
+  </p:extLst>
 </p:presentation>
 </file>
 
@@ -254,7 +261,7 @@
           <a:lstStyle/>
           <a:p>
             <a:fld id="{53E967B2-BFEF-8B41-A25A-F407681B5FBD}" type="datetimeFigureOut">
-              <a:t>11/2/24</a:t>
+              <a:t>5/7/25</a:t>
             </a:fld>
             <a:endParaRPr lang="en-US"/>
           </a:p>
@@ -450,7 +457,7 @@
           <a:lstStyle/>
           <a:p>
             <a:fld id="{53E967B2-BFEF-8B41-A25A-F407681B5FBD}" type="datetimeFigureOut">
-              <a:t>11/2/24</a:t>
+              <a:t>5/7/25</a:t>
             </a:fld>
             <a:endParaRPr lang="en-US"/>
           </a:p>
@@ -656,7 +663,7 @@
           <a:lstStyle/>
           <a:p>
             <a:fld id="{53E967B2-BFEF-8B41-A25A-F407681B5FBD}" type="datetimeFigureOut">
-              <a:t>11/2/24</a:t>
+              <a:t>5/7/25</a:t>
             </a:fld>
             <a:endParaRPr lang="en-US"/>
           </a:p>
@@ -852,7 +859,7 @@
           <a:lstStyle/>
           <a:p>
             <a:fld id="{53E967B2-BFEF-8B41-A25A-F407681B5FBD}" type="datetimeFigureOut">
-              <a:t>11/2/24</a:t>
+              <a:t>5/7/25</a:t>
             </a:fld>
             <a:endParaRPr lang="en-US"/>
           </a:p>
@@ -1125,7 +1132,7 @@
           <a:lstStyle/>
           <a:p>
             <a:fld id="{53E967B2-BFEF-8B41-A25A-F407681B5FBD}" type="datetimeFigureOut">
-              <a:t>11/2/24</a:t>
+              <a:t>5/7/25</a:t>
             </a:fld>
             <a:endParaRPr lang="en-US"/>
           </a:p>
@@ -1388,7 +1395,7 @@
           <a:lstStyle/>
           <a:p>
             <a:fld id="{53E967B2-BFEF-8B41-A25A-F407681B5FBD}" type="datetimeFigureOut">
-              <a:t>11/2/24</a:t>
+              <a:t>5/7/25</a:t>
             </a:fld>
             <a:endParaRPr lang="en-US"/>
           </a:p>
@@ -1798,7 +1805,7 @@
           <a:lstStyle/>
           <a:p>
             <a:fld id="{53E967B2-BFEF-8B41-A25A-F407681B5FBD}" type="datetimeFigureOut">
-              <a:t>11/2/24</a:t>
+              <a:t>5/7/25</a:t>
             </a:fld>
             <a:endParaRPr lang="en-US"/>
           </a:p>
@@ -1937,7 +1944,7 @@
           <a:lstStyle/>
           <a:p>
             <a:fld id="{53E967B2-BFEF-8B41-A25A-F407681B5FBD}" type="datetimeFigureOut">
-              <a:t>11/2/24</a:t>
+              <a:t>5/7/25</a:t>
             </a:fld>
             <a:endParaRPr lang="en-US"/>
           </a:p>
@@ -2048,7 +2055,7 @@
           <a:lstStyle/>
           <a:p>
             <a:fld id="{53E967B2-BFEF-8B41-A25A-F407681B5FBD}" type="datetimeFigureOut">
-              <a:t>11/2/24</a:t>
+              <a:t>5/7/25</a:t>
             </a:fld>
             <a:endParaRPr lang="en-US"/>
           </a:p>
@@ -2357,7 +2364,7 @@
           <a:lstStyle/>
           <a:p>
             <a:fld id="{53E967B2-BFEF-8B41-A25A-F407681B5FBD}" type="datetimeFigureOut">
-              <a:t>11/2/24</a:t>
+              <a:t>5/7/25</a:t>
             </a:fld>
             <a:endParaRPr lang="en-US"/>
           </a:p>
@@ -2643,7 +2650,7 @@
           <a:lstStyle/>
           <a:p>
             <a:fld id="{53E967B2-BFEF-8B41-A25A-F407681B5FBD}" type="datetimeFigureOut">
-              <a:t>11/2/24</a:t>
+              <a:t>5/7/25</a:t>
             </a:fld>
             <a:endParaRPr lang="en-US"/>
           </a:p>
@@ -2882,7 +2889,7 @@
           </a:lstStyle>
           <a:p>
             <a:fld id="{53E967B2-BFEF-8B41-A25A-F407681B5FBD}" type="datetimeFigureOut">
-              <a:t>11/2/24</a:t>
+              <a:t>5/7/25</a:t>
             </a:fld>
             <a:endParaRPr lang="en-US"/>
           </a:p>
@@ -7449,6 +7456,2861 @@
 </p:sld>
 </file>
 
+<file path=ppt/slides/slide3.xml><?xml version="1.0" encoding="utf-8"?>
+<p:sld xmlns:a="http://schemas.openxmlformats.org/drawingml/2006/main" xmlns:r="http://schemas.openxmlformats.org/officeDocument/2006/relationships" xmlns:p="http://schemas.openxmlformats.org/presentationml/2006/main">
+  <p:cSld>
+    <p:spTree>
+      <p:nvGrpSpPr>
+        <p:cNvPr id="1" name="">
+          <a:extLst>
+            <a:ext uri="{FF2B5EF4-FFF2-40B4-BE49-F238E27FC236}">
+              <a16:creationId xmlns:a16="http://schemas.microsoft.com/office/drawing/2014/main" id="{8A0AC2C9-9A63-BF92-7EE2-64D69BADBE0B}"/>
+            </a:ext>
+          </a:extLst>
+        </p:cNvPr>
+        <p:cNvGrpSpPr/>
+        <p:nvPr/>
+      </p:nvGrpSpPr>
+      <p:grpSpPr>
+        <a:xfrm>
+          <a:off x="0" y="0"/>
+          <a:ext cx="0" cy="0"/>
+          <a:chOff x="0" y="0"/>
+          <a:chExt cx="0" cy="0"/>
+        </a:xfrm>
+      </p:grpSpPr>
+      <p:grpSp>
+        <p:nvGrpSpPr>
+          <p:cNvPr id="86" name="Group 85">
+            <a:extLst>
+              <a:ext uri="{FF2B5EF4-FFF2-40B4-BE49-F238E27FC236}">
+                <a16:creationId xmlns:a16="http://schemas.microsoft.com/office/drawing/2014/main" id="{6F3D747B-FE77-006E-E394-E37FAB60BD3C}"/>
+              </a:ext>
+            </a:extLst>
+          </p:cNvPr>
+          <p:cNvGrpSpPr/>
+          <p:nvPr/>
+        </p:nvGrpSpPr>
+        <p:grpSpPr>
+          <a:xfrm>
+            <a:off x="740878" y="520614"/>
+            <a:ext cx="4973562" cy="4486347"/>
+            <a:chOff x="2696396" y="507718"/>
+            <a:chExt cx="4973562" cy="4486347"/>
+          </a:xfrm>
+        </p:grpSpPr>
+        <p:sp>
+          <p:nvSpPr>
+            <p:cNvPr id="21" name="Rectangle 20">
+              <a:extLst>
+                <a:ext uri="{FF2B5EF4-FFF2-40B4-BE49-F238E27FC236}">
+                  <a16:creationId xmlns:a16="http://schemas.microsoft.com/office/drawing/2014/main" id="{CF32068E-74BA-8675-131E-426EC517252E}"/>
+                </a:ext>
+              </a:extLst>
+            </p:cNvPr>
+            <p:cNvSpPr/>
+            <p:nvPr/>
+          </p:nvSpPr>
+          <p:spPr>
+            <a:xfrm>
+              <a:off x="4158617" y="1248500"/>
+              <a:ext cx="3326453" cy="3074120"/>
+            </a:xfrm>
+            <a:prstGeom prst="rect">
+              <a:avLst/>
+            </a:prstGeom>
+            <a:solidFill>
+              <a:schemeClr val="bg1">
+                <a:lumMod val="85000"/>
+              </a:schemeClr>
+            </a:solidFill>
+          </p:spPr>
+          <p:style>
+            <a:lnRef idx="2">
+              <a:schemeClr val="accent1">
+                <a:shade val="15000"/>
+              </a:schemeClr>
+            </a:lnRef>
+            <a:fillRef idx="1">
+              <a:schemeClr val="accent1"/>
+            </a:fillRef>
+            <a:effectRef idx="0">
+              <a:schemeClr val="accent1"/>
+            </a:effectRef>
+            <a:fontRef idx="minor">
+              <a:schemeClr val="lt1"/>
+            </a:fontRef>
+          </p:style>
+          <p:txBody>
+            <a:bodyPr rtlCol="0" anchor="ctr"/>
+            <a:lstStyle/>
+            <a:p>
+              <a:pPr algn="ctr"/>
+              <a:endParaRPr lang="en-US"/>
+            </a:p>
+          </p:txBody>
+        </p:sp>
+        <p:sp>
+          <p:nvSpPr>
+            <p:cNvPr id="2" name="Rectangle 1">
+              <a:extLst>
+                <a:ext uri="{FF2B5EF4-FFF2-40B4-BE49-F238E27FC236}">
+                  <a16:creationId xmlns:a16="http://schemas.microsoft.com/office/drawing/2014/main" id="{68045B74-3EE7-C983-3D2C-16A62BD5C69E}"/>
+                </a:ext>
+              </a:extLst>
+            </p:cNvPr>
+            <p:cNvSpPr/>
+            <p:nvPr/>
+          </p:nvSpPr>
+          <p:spPr>
+            <a:xfrm rot="5400000">
+              <a:off x="5654416" y="172714"/>
+              <a:ext cx="184888" cy="1998583"/>
+            </a:xfrm>
+            <a:prstGeom prst="rect">
+              <a:avLst/>
+            </a:prstGeom>
+            <a:solidFill>
+              <a:schemeClr val="accent3">
+                <a:lumMod val="40000"/>
+                <a:lumOff val="60000"/>
+              </a:schemeClr>
+            </a:solidFill>
+          </p:spPr>
+          <p:style>
+            <a:lnRef idx="2">
+              <a:schemeClr val="accent1">
+                <a:shade val="15000"/>
+              </a:schemeClr>
+            </a:lnRef>
+            <a:fillRef idx="1">
+              <a:schemeClr val="accent1"/>
+            </a:fillRef>
+            <a:effectRef idx="0">
+              <a:schemeClr val="accent1"/>
+            </a:effectRef>
+            <a:fontRef idx="minor">
+              <a:schemeClr val="lt1"/>
+            </a:fontRef>
+          </p:style>
+          <p:txBody>
+            <a:bodyPr rtlCol="0" anchor="ctr"/>
+            <a:lstStyle/>
+            <a:p>
+              <a:pPr algn="ctr"/>
+              <a:endParaRPr lang="en-US"/>
+            </a:p>
+          </p:txBody>
+        </p:sp>
+        <p:sp>
+          <p:nvSpPr>
+            <p:cNvPr id="5" name="Rectangle 4">
+              <a:extLst>
+                <a:ext uri="{FF2B5EF4-FFF2-40B4-BE49-F238E27FC236}">
+                  <a16:creationId xmlns:a16="http://schemas.microsoft.com/office/drawing/2014/main" id="{2E9C55D0-2F05-5835-E930-D50D7BB10405}"/>
+                </a:ext>
+              </a:extLst>
+            </p:cNvPr>
+            <p:cNvSpPr/>
+            <p:nvPr/>
+          </p:nvSpPr>
+          <p:spPr>
+            <a:xfrm rot="5400000">
+              <a:off x="5729399" y="3415773"/>
+              <a:ext cx="184888" cy="1998583"/>
+            </a:xfrm>
+            <a:prstGeom prst="rect">
+              <a:avLst/>
+            </a:prstGeom>
+            <a:solidFill>
+              <a:schemeClr val="accent3">
+                <a:lumMod val="40000"/>
+                <a:lumOff val="60000"/>
+              </a:schemeClr>
+            </a:solidFill>
+          </p:spPr>
+          <p:style>
+            <a:lnRef idx="2">
+              <a:schemeClr val="accent1">
+                <a:shade val="15000"/>
+              </a:schemeClr>
+            </a:lnRef>
+            <a:fillRef idx="1">
+              <a:schemeClr val="accent1"/>
+            </a:fillRef>
+            <a:effectRef idx="0">
+              <a:schemeClr val="accent1"/>
+            </a:effectRef>
+            <a:fontRef idx="minor">
+              <a:schemeClr val="lt1"/>
+            </a:fontRef>
+          </p:style>
+          <p:txBody>
+            <a:bodyPr rtlCol="0" anchor="ctr"/>
+            <a:lstStyle/>
+            <a:p>
+              <a:pPr algn="ctr"/>
+              <a:endParaRPr lang="en-US"/>
+            </a:p>
+          </p:txBody>
+        </p:sp>
+        <p:sp>
+          <p:nvSpPr>
+            <p:cNvPr id="19" name="Rectangle 18">
+              <a:extLst>
+                <a:ext uri="{FF2B5EF4-FFF2-40B4-BE49-F238E27FC236}">
+                  <a16:creationId xmlns:a16="http://schemas.microsoft.com/office/drawing/2014/main" id="{50308716-40DF-28F1-7EF1-8F26E02D0C29}"/>
+                </a:ext>
+              </a:extLst>
+            </p:cNvPr>
+            <p:cNvSpPr/>
+            <p:nvPr/>
+          </p:nvSpPr>
+          <p:spPr>
+            <a:xfrm rot="10800000">
+              <a:off x="3968391" y="1707041"/>
+              <a:ext cx="184888" cy="1998583"/>
+            </a:xfrm>
+            <a:prstGeom prst="rect">
+              <a:avLst/>
+            </a:prstGeom>
+            <a:solidFill>
+              <a:schemeClr val="accent3">
+                <a:lumMod val="40000"/>
+                <a:lumOff val="60000"/>
+              </a:schemeClr>
+            </a:solidFill>
+          </p:spPr>
+          <p:style>
+            <a:lnRef idx="2">
+              <a:schemeClr val="accent1">
+                <a:shade val="15000"/>
+              </a:schemeClr>
+            </a:lnRef>
+            <a:fillRef idx="1">
+              <a:schemeClr val="accent1"/>
+            </a:fillRef>
+            <a:effectRef idx="0">
+              <a:schemeClr val="accent1"/>
+            </a:effectRef>
+            <a:fontRef idx="minor">
+              <a:schemeClr val="lt1"/>
+            </a:fontRef>
+          </p:style>
+          <p:txBody>
+            <a:bodyPr rtlCol="0" anchor="ctr"/>
+            <a:lstStyle/>
+            <a:p>
+              <a:pPr algn="ctr"/>
+              <a:endParaRPr lang="en-US"/>
+            </a:p>
+          </p:txBody>
+        </p:sp>
+        <p:sp>
+          <p:nvSpPr>
+            <p:cNvPr id="23" name="Rectangle 22">
+              <a:extLst>
+                <a:ext uri="{FF2B5EF4-FFF2-40B4-BE49-F238E27FC236}">
+                  <a16:creationId xmlns:a16="http://schemas.microsoft.com/office/drawing/2014/main" id="{B1E65C88-339C-F86F-A974-A6A9080DC587}"/>
+                </a:ext>
+              </a:extLst>
+            </p:cNvPr>
+            <p:cNvSpPr/>
+            <p:nvPr/>
+          </p:nvSpPr>
+          <p:spPr>
+            <a:xfrm rot="10800000">
+              <a:off x="7485070" y="1707040"/>
+              <a:ext cx="184888" cy="1998583"/>
+            </a:xfrm>
+            <a:prstGeom prst="rect">
+              <a:avLst/>
+            </a:prstGeom>
+            <a:solidFill>
+              <a:schemeClr val="accent3">
+                <a:lumMod val="40000"/>
+                <a:lumOff val="60000"/>
+              </a:schemeClr>
+            </a:solidFill>
+          </p:spPr>
+          <p:style>
+            <a:lnRef idx="2">
+              <a:schemeClr val="accent1">
+                <a:shade val="15000"/>
+              </a:schemeClr>
+            </a:lnRef>
+            <a:fillRef idx="1">
+              <a:schemeClr val="accent1"/>
+            </a:fillRef>
+            <a:effectRef idx="0">
+              <a:schemeClr val="accent1"/>
+            </a:effectRef>
+            <a:fontRef idx="minor">
+              <a:schemeClr val="lt1"/>
+            </a:fontRef>
+          </p:style>
+          <p:txBody>
+            <a:bodyPr rtlCol="0" anchor="ctr"/>
+            <a:lstStyle/>
+            <a:p>
+              <a:pPr algn="ctr"/>
+              <a:endParaRPr lang="en-US"/>
+            </a:p>
+          </p:txBody>
+        </p:sp>
+        <p:cxnSp>
+          <p:nvCxnSpPr>
+            <p:cNvPr id="38" name="Straight Connector 37">
+              <a:extLst>
+                <a:ext uri="{FF2B5EF4-FFF2-40B4-BE49-F238E27FC236}">
+                  <a16:creationId xmlns:a16="http://schemas.microsoft.com/office/drawing/2014/main" id="{008FB4FF-2A85-D9BE-8AAA-10C004353A0B}"/>
+                </a:ext>
+              </a:extLst>
+            </p:cNvPr>
+            <p:cNvCxnSpPr>
+              <a:cxnSpLocks/>
+            </p:cNvCxnSpPr>
+            <p:nvPr/>
+          </p:nvCxnSpPr>
+          <p:spPr>
+            <a:xfrm>
+              <a:off x="3445224" y="2390794"/>
+              <a:ext cx="4039846" cy="0"/>
+            </a:xfrm>
+            <a:prstGeom prst="line">
+              <a:avLst/>
+            </a:prstGeom>
+            <a:ln w="47625">
+              <a:solidFill>
+                <a:srgbClr val="FF0000"/>
+              </a:solidFill>
+              <a:tailEnd type="triangle"/>
+            </a:ln>
+          </p:spPr>
+          <p:style>
+            <a:lnRef idx="2">
+              <a:schemeClr val="accent1"/>
+            </a:lnRef>
+            <a:fillRef idx="0">
+              <a:schemeClr val="accent1"/>
+            </a:fillRef>
+            <a:effectRef idx="1">
+              <a:schemeClr val="accent1"/>
+            </a:effectRef>
+            <a:fontRef idx="minor">
+              <a:schemeClr val="tx1"/>
+            </a:fontRef>
+          </p:style>
+        </p:cxnSp>
+        <p:cxnSp>
+          <p:nvCxnSpPr>
+            <p:cNvPr id="60" name="Straight Connector 59">
+              <a:extLst>
+                <a:ext uri="{FF2B5EF4-FFF2-40B4-BE49-F238E27FC236}">
+                  <a16:creationId xmlns:a16="http://schemas.microsoft.com/office/drawing/2014/main" id="{22E18F07-E236-C245-DCFA-50003BC071F9}"/>
+                </a:ext>
+              </a:extLst>
+            </p:cNvPr>
+            <p:cNvCxnSpPr>
+              <a:cxnSpLocks/>
+            </p:cNvCxnSpPr>
+            <p:nvPr/>
+          </p:nvCxnSpPr>
+          <p:spPr>
+            <a:xfrm>
+              <a:off x="3445224" y="2629691"/>
+              <a:ext cx="4039846" cy="0"/>
+            </a:xfrm>
+            <a:prstGeom prst="line">
+              <a:avLst/>
+            </a:prstGeom>
+            <a:ln w="47625">
+              <a:solidFill>
+                <a:srgbClr val="FF0000"/>
+              </a:solidFill>
+              <a:tailEnd type="triangle"/>
+            </a:ln>
+          </p:spPr>
+          <p:style>
+            <a:lnRef idx="2">
+              <a:schemeClr val="accent1"/>
+            </a:lnRef>
+            <a:fillRef idx="0">
+              <a:schemeClr val="accent1"/>
+            </a:fillRef>
+            <a:effectRef idx="1">
+              <a:schemeClr val="accent1"/>
+            </a:effectRef>
+            <a:fontRef idx="minor">
+              <a:schemeClr val="tx1"/>
+            </a:fontRef>
+          </p:style>
+        </p:cxnSp>
+        <p:grpSp>
+          <p:nvGrpSpPr>
+            <p:cNvPr id="70" name="Group 69">
+              <a:extLst>
+                <a:ext uri="{FF2B5EF4-FFF2-40B4-BE49-F238E27FC236}">
+                  <a16:creationId xmlns:a16="http://schemas.microsoft.com/office/drawing/2014/main" id="{2ADDED64-47A4-D171-0C8E-46A03DA6B71C}"/>
+                </a:ext>
+              </a:extLst>
+            </p:cNvPr>
+            <p:cNvGrpSpPr/>
+            <p:nvPr/>
+          </p:nvGrpSpPr>
+          <p:grpSpPr>
+            <a:xfrm>
+              <a:off x="5881816" y="844783"/>
+              <a:ext cx="1603254" cy="1043907"/>
+              <a:chOff x="5881816" y="844783"/>
+              <a:chExt cx="1603254" cy="1043907"/>
+            </a:xfrm>
+          </p:grpSpPr>
+          <p:cxnSp>
+            <p:nvCxnSpPr>
+              <p:cNvPr id="62" name="Straight Connector 61">
+                <a:extLst>
+                  <a:ext uri="{FF2B5EF4-FFF2-40B4-BE49-F238E27FC236}">
+                    <a16:creationId xmlns:a16="http://schemas.microsoft.com/office/drawing/2014/main" id="{17DECAFD-CC29-1132-92BC-E9CBBCD43C9E}"/>
+                  </a:ext>
+                </a:extLst>
+              </p:cNvPr>
+              <p:cNvCxnSpPr>
+                <a:cxnSpLocks/>
+              </p:cNvCxnSpPr>
+              <p:nvPr/>
+            </p:nvCxnSpPr>
+            <p:spPr>
+              <a:xfrm>
+                <a:off x="5881816" y="1880047"/>
+                <a:ext cx="1603254" cy="0"/>
+              </a:xfrm>
+              <a:prstGeom prst="line">
+                <a:avLst/>
+              </a:prstGeom>
+              <a:ln w="47625">
+                <a:solidFill>
+                  <a:srgbClr val="FF0000"/>
+                </a:solidFill>
+                <a:tailEnd type="triangle"/>
+              </a:ln>
+            </p:spPr>
+            <p:style>
+              <a:lnRef idx="2">
+                <a:schemeClr val="accent1"/>
+              </a:lnRef>
+              <a:fillRef idx="0">
+                <a:schemeClr val="accent1"/>
+              </a:fillRef>
+              <a:effectRef idx="1">
+                <a:schemeClr val="accent1"/>
+              </a:effectRef>
+              <a:fontRef idx="minor">
+                <a:schemeClr val="tx1"/>
+              </a:fontRef>
+            </p:style>
+          </p:cxnSp>
+          <p:cxnSp>
+            <p:nvCxnSpPr>
+              <p:cNvPr id="68" name="Straight Connector 67">
+                <a:extLst>
+                  <a:ext uri="{FF2B5EF4-FFF2-40B4-BE49-F238E27FC236}">
+                    <a16:creationId xmlns:a16="http://schemas.microsoft.com/office/drawing/2014/main" id="{6D092752-7943-4C42-9815-D6C6A81D1972}"/>
+                  </a:ext>
+                </a:extLst>
+              </p:cNvPr>
+              <p:cNvCxnSpPr>
+                <a:cxnSpLocks/>
+              </p:cNvCxnSpPr>
+              <p:nvPr/>
+            </p:nvCxnSpPr>
+            <p:spPr>
+              <a:xfrm flipV="1">
+                <a:off x="5898292" y="844783"/>
+                <a:ext cx="0" cy="1043907"/>
+              </a:xfrm>
+              <a:prstGeom prst="line">
+                <a:avLst/>
+              </a:prstGeom>
+              <a:ln w="47625">
+                <a:solidFill>
+                  <a:srgbClr val="FF0000"/>
+                </a:solidFill>
+                <a:tailEnd type="none"/>
+              </a:ln>
+            </p:spPr>
+            <p:style>
+              <a:lnRef idx="2">
+                <a:schemeClr val="accent1"/>
+              </a:lnRef>
+              <a:fillRef idx="0">
+                <a:schemeClr val="accent1"/>
+              </a:fillRef>
+              <a:effectRef idx="1">
+                <a:schemeClr val="accent1"/>
+              </a:effectRef>
+              <a:fontRef idx="minor">
+                <a:schemeClr val="tx1"/>
+              </a:fontRef>
+            </p:style>
+          </p:cxnSp>
+        </p:grpSp>
+        <p:grpSp>
+          <p:nvGrpSpPr>
+            <p:cNvPr id="71" name="Group 70">
+              <a:extLst>
+                <a:ext uri="{FF2B5EF4-FFF2-40B4-BE49-F238E27FC236}">
+                  <a16:creationId xmlns:a16="http://schemas.microsoft.com/office/drawing/2014/main" id="{08636515-B4DC-9D58-3042-CBDE52498F93}"/>
+                </a:ext>
+              </a:extLst>
+            </p:cNvPr>
+            <p:cNvGrpSpPr/>
+            <p:nvPr/>
+          </p:nvGrpSpPr>
+          <p:grpSpPr>
+            <a:xfrm flipV="1">
+              <a:off x="5887154" y="3018554"/>
+              <a:ext cx="1603254" cy="1790845"/>
+              <a:chOff x="5881816" y="97845"/>
+              <a:chExt cx="1603254" cy="1790845"/>
+            </a:xfrm>
+          </p:grpSpPr>
+          <p:cxnSp>
+            <p:nvCxnSpPr>
+              <p:cNvPr id="72" name="Straight Connector 71">
+                <a:extLst>
+                  <a:ext uri="{FF2B5EF4-FFF2-40B4-BE49-F238E27FC236}">
+                    <a16:creationId xmlns:a16="http://schemas.microsoft.com/office/drawing/2014/main" id="{FCB3C5F5-4CFB-F5E6-C920-0343E3DD6224}"/>
+                  </a:ext>
+                </a:extLst>
+              </p:cNvPr>
+              <p:cNvCxnSpPr>
+                <a:cxnSpLocks/>
+              </p:cNvCxnSpPr>
+              <p:nvPr/>
+            </p:nvCxnSpPr>
+            <p:spPr>
+              <a:xfrm>
+                <a:off x="5881816" y="1880047"/>
+                <a:ext cx="1603254" cy="0"/>
+              </a:xfrm>
+              <a:prstGeom prst="line">
+                <a:avLst/>
+              </a:prstGeom>
+              <a:ln w="47625">
+                <a:solidFill>
+                  <a:srgbClr val="FF0000"/>
+                </a:solidFill>
+                <a:tailEnd type="triangle"/>
+              </a:ln>
+            </p:spPr>
+            <p:style>
+              <a:lnRef idx="2">
+                <a:schemeClr val="accent1"/>
+              </a:lnRef>
+              <a:fillRef idx="0">
+                <a:schemeClr val="accent1"/>
+              </a:fillRef>
+              <a:effectRef idx="1">
+                <a:schemeClr val="accent1"/>
+              </a:effectRef>
+              <a:fontRef idx="minor">
+                <a:schemeClr val="tx1"/>
+              </a:fontRef>
+            </p:style>
+          </p:cxnSp>
+          <p:cxnSp>
+            <p:nvCxnSpPr>
+              <p:cNvPr id="73" name="Straight Connector 72">
+                <a:extLst>
+                  <a:ext uri="{FF2B5EF4-FFF2-40B4-BE49-F238E27FC236}">
+                    <a16:creationId xmlns:a16="http://schemas.microsoft.com/office/drawing/2014/main" id="{3C151F40-ED11-5720-A587-3B94107D7EE0}"/>
+                  </a:ext>
+                </a:extLst>
+              </p:cNvPr>
+              <p:cNvCxnSpPr>
+                <a:cxnSpLocks/>
+              </p:cNvCxnSpPr>
+              <p:nvPr/>
+            </p:nvCxnSpPr>
+            <p:spPr>
+              <a:xfrm flipV="1">
+                <a:off x="5898292" y="97845"/>
+                <a:ext cx="0" cy="1790845"/>
+              </a:xfrm>
+              <a:prstGeom prst="line">
+                <a:avLst/>
+              </a:prstGeom>
+              <a:ln w="47625">
+                <a:solidFill>
+                  <a:srgbClr val="FF0000"/>
+                </a:solidFill>
+                <a:tailEnd type="none"/>
+              </a:ln>
+            </p:spPr>
+            <p:style>
+              <a:lnRef idx="2">
+                <a:schemeClr val="accent1"/>
+              </a:lnRef>
+              <a:fillRef idx="0">
+                <a:schemeClr val="accent1"/>
+              </a:fillRef>
+              <a:effectRef idx="1">
+                <a:schemeClr val="accent1"/>
+              </a:effectRef>
+              <a:fontRef idx="minor">
+                <a:schemeClr val="tx1"/>
+              </a:fontRef>
+            </p:style>
+          </p:cxnSp>
+        </p:grpSp>
+        <p:grpSp>
+          <p:nvGrpSpPr>
+            <p:cNvPr id="75" name="Group 74">
+              <a:extLst>
+                <a:ext uri="{FF2B5EF4-FFF2-40B4-BE49-F238E27FC236}">
+                  <a16:creationId xmlns:a16="http://schemas.microsoft.com/office/drawing/2014/main" id="{3E54450B-EE2C-5F6F-4998-296618C51848}"/>
+                </a:ext>
+              </a:extLst>
+            </p:cNvPr>
+            <p:cNvGrpSpPr/>
+            <p:nvPr/>
+          </p:nvGrpSpPr>
+          <p:grpSpPr>
+            <a:xfrm flipV="1">
+              <a:off x="6050692" y="3256703"/>
+              <a:ext cx="1450854" cy="1543897"/>
+              <a:chOff x="5881816" y="344793"/>
+              <a:chExt cx="1450854" cy="1543897"/>
+            </a:xfrm>
+          </p:grpSpPr>
+          <p:cxnSp>
+            <p:nvCxnSpPr>
+              <p:cNvPr id="76" name="Straight Connector 75">
+                <a:extLst>
+                  <a:ext uri="{FF2B5EF4-FFF2-40B4-BE49-F238E27FC236}">
+                    <a16:creationId xmlns:a16="http://schemas.microsoft.com/office/drawing/2014/main" id="{5AFBF66C-A097-1185-D52E-A5AA7B95BAFB}"/>
+                  </a:ext>
+                </a:extLst>
+              </p:cNvPr>
+              <p:cNvCxnSpPr>
+                <a:cxnSpLocks/>
+              </p:cNvCxnSpPr>
+              <p:nvPr/>
+            </p:nvCxnSpPr>
+            <p:spPr>
+              <a:xfrm flipV="1">
+                <a:off x="5881816" y="1880047"/>
+                <a:ext cx="1450854" cy="0"/>
+              </a:xfrm>
+              <a:prstGeom prst="line">
+                <a:avLst/>
+              </a:prstGeom>
+              <a:ln w="47625">
+                <a:solidFill>
+                  <a:srgbClr val="FF0000"/>
+                </a:solidFill>
+                <a:tailEnd type="triangle"/>
+              </a:ln>
+            </p:spPr>
+            <p:style>
+              <a:lnRef idx="2">
+                <a:schemeClr val="accent1"/>
+              </a:lnRef>
+              <a:fillRef idx="0">
+                <a:schemeClr val="accent1"/>
+              </a:fillRef>
+              <a:effectRef idx="1">
+                <a:schemeClr val="accent1"/>
+              </a:effectRef>
+              <a:fontRef idx="minor">
+                <a:schemeClr val="tx1"/>
+              </a:fontRef>
+            </p:style>
+          </p:cxnSp>
+          <p:cxnSp>
+            <p:nvCxnSpPr>
+              <p:cNvPr id="77" name="Straight Connector 76">
+                <a:extLst>
+                  <a:ext uri="{FF2B5EF4-FFF2-40B4-BE49-F238E27FC236}">
+                    <a16:creationId xmlns:a16="http://schemas.microsoft.com/office/drawing/2014/main" id="{FBB299D2-7C51-ACD0-B81F-1BF274935AA8}"/>
+                  </a:ext>
+                </a:extLst>
+              </p:cNvPr>
+              <p:cNvCxnSpPr>
+                <a:cxnSpLocks/>
+              </p:cNvCxnSpPr>
+              <p:nvPr/>
+            </p:nvCxnSpPr>
+            <p:spPr>
+              <a:xfrm flipV="1">
+                <a:off x="5898292" y="344793"/>
+                <a:ext cx="0" cy="1543897"/>
+              </a:xfrm>
+              <a:prstGeom prst="line">
+                <a:avLst/>
+              </a:prstGeom>
+              <a:ln w="47625">
+                <a:solidFill>
+                  <a:srgbClr val="FF0000"/>
+                </a:solidFill>
+                <a:tailEnd type="none"/>
+              </a:ln>
+            </p:spPr>
+            <p:style>
+              <a:lnRef idx="2">
+                <a:schemeClr val="accent1"/>
+              </a:lnRef>
+              <a:fillRef idx="0">
+                <a:schemeClr val="accent1"/>
+              </a:fillRef>
+              <a:effectRef idx="1">
+                <a:schemeClr val="accent1"/>
+              </a:effectRef>
+              <a:fontRef idx="minor">
+                <a:schemeClr val="tx1"/>
+              </a:fontRef>
+            </p:style>
+          </p:cxnSp>
+        </p:grpSp>
+        <p:sp>
+          <p:nvSpPr>
+            <p:cNvPr id="80" name="TextBox 79">
+              <a:extLst>
+                <a:ext uri="{FF2B5EF4-FFF2-40B4-BE49-F238E27FC236}">
+                  <a16:creationId xmlns:a16="http://schemas.microsoft.com/office/drawing/2014/main" id="{67D3E6DE-D1DF-20FD-B8E5-C9B37841D536}"/>
+                </a:ext>
+              </a:extLst>
+            </p:cNvPr>
+            <p:cNvSpPr txBox="1"/>
+            <p:nvPr/>
+          </p:nvSpPr>
+          <p:spPr>
+            <a:xfrm>
+              <a:off x="5545436" y="507718"/>
+              <a:ext cx="738664" cy="369332"/>
+            </a:xfrm>
+            <a:prstGeom prst="rect">
+              <a:avLst/>
+            </a:prstGeom>
+            <a:noFill/>
+          </p:spPr>
+          <p:txBody>
+            <a:bodyPr wrap="none" rtlCol="0">
+              <a:spAutoFit/>
+            </a:bodyPr>
+            <a:lstStyle/>
+            <a:p>
+              <a:r>
+                <a:rPr lang="en-US"/>
+                <a:t>Flow</a:t>
+              </a:r>
+              <a:r>
+                <a:rPr lang="en-US" baseline="-25000"/>
+                <a:t>1</a:t>
+              </a:r>
+              <a:endParaRPr lang="en-US"/>
+            </a:p>
+          </p:txBody>
+        </p:sp>
+        <p:sp>
+          <p:nvSpPr>
+            <p:cNvPr id="81" name="TextBox 80">
+              <a:extLst>
+                <a:ext uri="{FF2B5EF4-FFF2-40B4-BE49-F238E27FC236}">
+                  <a16:creationId xmlns:a16="http://schemas.microsoft.com/office/drawing/2014/main" id="{ED4339C6-C14F-1C1A-E205-20772DD1202E}"/>
+                </a:ext>
+              </a:extLst>
+            </p:cNvPr>
+            <p:cNvSpPr txBox="1"/>
+            <p:nvPr/>
+          </p:nvSpPr>
+          <p:spPr>
+            <a:xfrm>
+              <a:off x="2696396" y="2206128"/>
+              <a:ext cx="738664" cy="369332"/>
+            </a:xfrm>
+            <a:prstGeom prst="rect">
+              <a:avLst/>
+            </a:prstGeom>
+            <a:noFill/>
+          </p:spPr>
+          <p:txBody>
+            <a:bodyPr wrap="none" rtlCol="0">
+              <a:spAutoFit/>
+            </a:bodyPr>
+            <a:lstStyle/>
+            <a:p>
+              <a:r>
+                <a:rPr lang="en-US"/>
+                <a:t>Flow</a:t>
+              </a:r>
+              <a:r>
+                <a:rPr lang="en-US" baseline="-25000"/>
+                <a:t>2</a:t>
+              </a:r>
+              <a:endParaRPr lang="en-US"/>
+            </a:p>
+          </p:txBody>
+        </p:sp>
+        <p:sp>
+          <p:nvSpPr>
+            <p:cNvPr id="82" name="TextBox 81">
+              <a:extLst>
+                <a:ext uri="{FF2B5EF4-FFF2-40B4-BE49-F238E27FC236}">
+                  <a16:creationId xmlns:a16="http://schemas.microsoft.com/office/drawing/2014/main" id="{DFE726C1-FEC4-55A2-AC23-AB5BFE613ABF}"/>
+                </a:ext>
+              </a:extLst>
+            </p:cNvPr>
+            <p:cNvSpPr txBox="1"/>
+            <p:nvPr/>
+          </p:nvSpPr>
+          <p:spPr>
+            <a:xfrm>
+              <a:off x="2707113" y="2441843"/>
+              <a:ext cx="738664" cy="369332"/>
+            </a:xfrm>
+            <a:prstGeom prst="rect">
+              <a:avLst/>
+            </a:prstGeom>
+            <a:noFill/>
+          </p:spPr>
+          <p:txBody>
+            <a:bodyPr wrap="none" rtlCol="0">
+              <a:spAutoFit/>
+            </a:bodyPr>
+            <a:lstStyle/>
+            <a:p>
+              <a:r>
+                <a:rPr lang="en-US"/>
+                <a:t>Flow</a:t>
+              </a:r>
+              <a:r>
+                <a:rPr lang="en-US" baseline="-25000"/>
+                <a:t>3</a:t>
+              </a:r>
+              <a:endParaRPr lang="en-US"/>
+            </a:p>
+          </p:txBody>
+        </p:sp>
+        <p:sp>
+          <p:nvSpPr>
+            <p:cNvPr id="83" name="TextBox 82">
+              <a:extLst>
+                <a:ext uri="{FF2B5EF4-FFF2-40B4-BE49-F238E27FC236}">
+                  <a16:creationId xmlns:a16="http://schemas.microsoft.com/office/drawing/2014/main" id="{C4B41346-1FAD-B9B4-A63B-84C47C87CF9A}"/>
+                </a:ext>
+              </a:extLst>
+            </p:cNvPr>
+            <p:cNvSpPr txBox="1"/>
+            <p:nvPr/>
+          </p:nvSpPr>
+          <p:spPr>
+            <a:xfrm>
+              <a:off x="6061342" y="4615086"/>
+              <a:ext cx="738664" cy="369332"/>
+            </a:xfrm>
+            <a:prstGeom prst="rect">
+              <a:avLst/>
+            </a:prstGeom>
+            <a:noFill/>
+          </p:spPr>
+          <p:txBody>
+            <a:bodyPr wrap="none" rtlCol="0">
+              <a:spAutoFit/>
+            </a:bodyPr>
+            <a:lstStyle/>
+            <a:p>
+              <a:r>
+                <a:rPr lang="en-US"/>
+                <a:t>Flow</a:t>
+              </a:r>
+              <a:r>
+                <a:rPr lang="en-US" baseline="-25000"/>
+                <a:t>5</a:t>
+              </a:r>
+              <a:endParaRPr lang="en-US"/>
+            </a:p>
+          </p:txBody>
+        </p:sp>
+        <p:sp>
+          <p:nvSpPr>
+            <p:cNvPr id="84" name="TextBox 83">
+              <a:extLst>
+                <a:ext uri="{FF2B5EF4-FFF2-40B4-BE49-F238E27FC236}">
+                  <a16:creationId xmlns:a16="http://schemas.microsoft.com/office/drawing/2014/main" id="{64B882CC-48D7-45C5-9C5B-DA0D0D8F7C31}"/>
+                </a:ext>
+              </a:extLst>
+            </p:cNvPr>
+            <p:cNvSpPr txBox="1"/>
+            <p:nvPr/>
+          </p:nvSpPr>
+          <p:spPr>
+            <a:xfrm>
+              <a:off x="5197078" y="4624733"/>
+              <a:ext cx="738664" cy="369332"/>
+            </a:xfrm>
+            <a:prstGeom prst="rect">
+              <a:avLst/>
+            </a:prstGeom>
+            <a:noFill/>
+          </p:spPr>
+          <p:txBody>
+            <a:bodyPr wrap="none" rtlCol="0">
+              <a:spAutoFit/>
+            </a:bodyPr>
+            <a:lstStyle/>
+            <a:p>
+              <a:r>
+                <a:rPr lang="en-US"/>
+                <a:t>Flow</a:t>
+              </a:r>
+              <a:r>
+                <a:rPr lang="en-US" baseline="-25000"/>
+                <a:t>4</a:t>
+              </a:r>
+              <a:endParaRPr lang="en-US"/>
+            </a:p>
+          </p:txBody>
+        </p:sp>
+      </p:grpSp>
+      <p:grpSp>
+        <p:nvGrpSpPr>
+          <p:cNvPr id="87" name="Group 86">
+            <a:extLst>
+              <a:ext uri="{FF2B5EF4-FFF2-40B4-BE49-F238E27FC236}">
+                <a16:creationId xmlns:a16="http://schemas.microsoft.com/office/drawing/2014/main" id="{A882999C-E02B-336E-4D00-ED923EF4DF98}"/>
+              </a:ext>
+            </a:extLst>
+          </p:cNvPr>
+          <p:cNvGrpSpPr/>
+          <p:nvPr/>
+        </p:nvGrpSpPr>
+        <p:grpSpPr>
+          <a:xfrm>
+            <a:off x="6997982" y="823011"/>
+            <a:ext cx="3979887" cy="4238847"/>
+            <a:chOff x="3690255" y="844783"/>
+            <a:chExt cx="3979887" cy="4238847"/>
+          </a:xfrm>
+        </p:grpSpPr>
+        <p:sp>
+          <p:nvSpPr>
+            <p:cNvPr id="88" name="Rectangle 87">
+              <a:extLst>
+                <a:ext uri="{FF2B5EF4-FFF2-40B4-BE49-F238E27FC236}">
+                  <a16:creationId xmlns:a16="http://schemas.microsoft.com/office/drawing/2014/main" id="{33ACA29E-2F92-C1BE-6EB1-3FF4AA78FD05}"/>
+                </a:ext>
+              </a:extLst>
+            </p:cNvPr>
+            <p:cNvSpPr/>
+            <p:nvPr/>
+          </p:nvSpPr>
+          <p:spPr>
+            <a:xfrm>
+              <a:off x="4158617" y="1248500"/>
+              <a:ext cx="3326453" cy="3074120"/>
+            </a:xfrm>
+            <a:prstGeom prst="rect">
+              <a:avLst/>
+            </a:prstGeom>
+            <a:solidFill>
+              <a:schemeClr val="bg1">
+                <a:lumMod val="85000"/>
+              </a:schemeClr>
+            </a:solidFill>
+          </p:spPr>
+          <p:style>
+            <a:lnRef idx="2">
+              <a:schemeClr val="accent1">
+                <a:shade val="15000"/>
+              </a:schemeClr>
+            </a:lnRef>
+            <a:fillRef idx="1">
+              <a:schemeClr val="accent1"/>
+            </a:fillRef>
+            <a:effectRef idx="0">
+              <a:schemeClr val="accent1"/>
+            </a:effectRef>
+            <a:fontRef idx="minor">
+              <a:schemeClr val="lt1"/>
+            </a:fontRef>
+          </p:style>
+          <p:txBody>
+            <a:bodyPr rtlCol="0" anchor="ctr"/>
+            <a:lstStyle/>
+            <a:p>
+              <a:pPr algn="ctr"/>
+              <a:endParaRPr lang="en-US"/>
+            </a:p>
+          </p:txBody>
+        </p:sp>
+        <p:sp>
+          <p:nvSpPr>
+            <p:cNvPr id="89" name="Rectangle 88">
+              <a:extLst>
+                <a:ext uri="{FF2B5EF4-FFF2-40B4-BE49-F238E27FC236}">
+                  <a16:creationId xmlns:a16="http://schemas.microsoft.com/office/drawing/2014/main" id="{959B7FAC-6724-27A6-9C38-3FF28FF88156}"/>
+                </a:ext>
+              </a:extLst>
+            </p:cNvPr>
+            <p:cNvSpPr/>
+            <p:nvPr/>
+          </p:nvSpPr>
+          <p:spPr>
+            <a:xfrm rot="5400000">
+              <a:off x="5654416" y="172714"/>
+              <a:ext cx="184888" cy="1998583"/>
+            </a:xfrm>
+            <a:prstGeom prst="rect">
+              <a:avLst/>
+            </a:prstGeom>
+            <a:solidFill>
+              <a:schemeClr val="accent3">
+                <a:lumMod val="40000"/>
+                <a:lumOff val="60000"/>
+              </a:schemeClr>
+            </a:solidFill>
+          </p:spPr>
+          <p:style>
+            <a:lnRef idx="2">
+              <a:schemeClr val="accent1">
+                <a:shade val="15000"/>
+              </a:schemeClr>
+            </a:lnRef>
+            <a:fillRef idx="1">
+              <a:schemeClr val="accent1"/>
+            </a:fillRef>
+            <a:effectRef idx="0">
+              <a:schemeClr val="accent1"/>
+            </a:effectRef>
+            <a:fontRef idx="minor">
+              <a:schemeClr val="lt1"/>
+            </a:fontRef>
+          </p:style>
+          <p:txBody>
+            <a:bodyPr rtlCol="0" anchor="ctr"/>
+            <a:lstStyle/>
+            <a:p>
+              <a:pPr algn="ctr"/>
+              <a:endParaRPr lang="en-US"/>
+            </a:p>
+          </p:txBody>
+        </p:sp>
+        <p:sp>
+          <p:nvSpPr>
+            <p:cNvPr id="90" name="Rectangle 89">
+              <a:extLst>
+                <a:ext uri="{FF2B5EF4-FFF2-40B4-BE49-F238E27FC236}">
+                  <a16:creationId xmlns:a16="http://schemas.microsoft.com/office/drawing/2014/main" id="{B871CFE3-B303-4880-A55F-01A7BE695D2B}"/>
+                </a:ext>
+              </a:extLst>
+            </p:cNvPr>
+            <p:cNvSpPr/>
+            <p:nvPr/>
+          </p:nvSpPr>
+          <p:spPr>
+            <a:xfrm rot="5400000">
+              <a:off x="5729399" y="3415773"/>
+              <a:ext cx="184888" cy="1998583"/>
+            </a:xfrm>
+            <a:prstGeom prst="rect">
+              <a:avLst/>
+            </a:prstGeom>
+            <a:solidFill>
+              <a:schemeClr val="accent3">
+                <a:lumMod val="40000"/>
+                <a:lumOff val="60000"/>
+              </a:schemeClr>
+            </a:solidFill>
+          </p:spPr>
+          <p:style>
+            <a:lnRef idx="2">
+              <a:schemeClr val="accent1">
+                <a:shade val="15000"/>
+              </a:schemeClr>
+            </a:lnRef>
+            <a:fillRef idx="1">
+              <a:schemeClr val="accent1"/>
+            </a:fillRef>
+            <a:effectRef idx="0">
+              <a:schemeClr val="accent1"/>
+            </a:effectRef>
+            <a:fontRef idx="minor">
+              <a:schemeClr val="lt1"/>
+            </a:fontRef>
+          </p:style>
+          <p:txBody>
+            <a:bodyPr rtlCol="0" anchor="ctr"/>
+            <a:lstStyle/>
+            <a:p>
+              <a:pPr algn="ctr"/>
+              <a:endParaRPr lang="en-US"/>
+            </a:p>
+          </p:txBody>
+        </p:sp>
+        <p:sp>
+          <p:nvSpPr>
+            <p:cNvPr id="91" name="Rectangle 90">
+              <a:extLst>
+                <a:ext uri="{FF2B5EF4-FFF2-40B4-BE49-F238E27FC236}">
+                  <a16:creationId xmlns:a16="http://schemas.microsoft.com/office/drawing/2014/main" id="{2BBD2601-594C-7B53-8BF3-9ABE38E401DD}"/>
+                </a:ext>
+              </a:extLst>
+            </p:cNvPr>
+            <p:cNvSpPr/>
+            <p:nvPr/>
+          </p:nvSpPr>
+          <p:spPr>
+            <a:xfrm rot="10800000">
+              <a:off x="3968391" y="1707041"/>
+              <a:ext cx="184888" cy="1998583"/>
+            </a:xfrm>
+            <a:prstGeom prst="rect">
+              <a:avLst/>
+            </a:prstGeom>
+            <a:solidFill>
+              <a:schemeClr val="accent3">
+                <a:lumMod val="40000"/>
+                <a:lumOff val="60000"/>
+              </a:schemeClr>
+            </a:solidFill>
+          </p:spPr>
+          <p:style>
+            <a:lnRef idx="2">
+              <a:schemeClr val="accent1">
+                <a:shade val="15000"/>
+              </a:schemeClr>
+            </a:lnRef>
+            <a:fillRef idx="1">
+              <a:schemeClr val="accent1"/>
+            </a:fillRef>
+            <a:effectRef idx="0">
+              <a:schemeClr val="accent1"/>
+            </a:effectRef>
+            <a:fontRef idx="minor">
+              <a:schemeClr val="lt1"/>
+            </a:fontRef>
+          </p:style>
+          <p:txBody>
+            <a:bodyPr rtlCol="0" anchor="ctr"/>
+            <a:lstStyle/>
+            <a:p>
+              <a:pPr algn="ctr"/>
+              <a:endParaRPr lang="en-US"/>
+            </a:p>
+          </p:txBody>
+        </p:sp>
+        <p:sp>
+          <p:nvSpPr>
+            <p:cNvPr id="92" name="Rectangle 91">
+              <a:extLst>
+                <a:ext uri="{FF2B5EF4-FFF2-40B4-BE49-F238E27FC236}">
+                  <a16:creationId xmlns:a16="http://schemas.microsoft.com/office/drawing/2014/main" id="{9BDC9B5E-8916-678B-4492-87FEE267B5B7}"/>
+                </a:ext>
+              </a:extLst>
+            </p:cNvPr>
+            <p:cNvSpPr/>
+            <p:nvPr/>
+          </p:nvSpPr>
+          <p:spPr>
+            <a:xfrm rot="10800000">
+              <a:off x="7485070" y="1707040"/>
+              <a:ext cx="184888" cy="1998583"/>
+            </a:xfrm>
+            <a:prstGeom prst="rect">
+              <a:avLst/>
+            </a:prstGeom>
+            <a:solidFill>
+              <a:schemeClr val="accent3">
+                <a:lumMod val="40000"/>
+                <a:lumOff val="60000"/>
+              </a:schemeClr>
+            </a:solidFill>
+          </p:spPr>
+          <p:style>
+            <a:lnRef idx="2">
+              <a:schemeClr val="accent1">
+                <a:shade val="15000"/>
+              </a:schemeClr>
+            </a:lnRef>
+            <a:fillRef idx="1">
+              <a:schemeClr val="accent1"/>
+            </a:fillRef>
+            <a:effectRef idx="0">
+              <a:schemeClr val="accent1"/>
+            </a:effectRef>
+            <a:fontRef idx="minor">
+              <a:schemeClr val="lt1"/>
+            </a:fontRef>
+          </p:style>
+          <p:txBody>
+            <a:bodyPr rtlCol="0" anchor="ctr"/>
+            <a:lstStyle/>
+            <a:p>
+              <a:pPr algn="ctr"/>
+              <a:endParaRPr lang="en-US"/>
+            </a:p>
+          </p:txBody>
+        </p:sp>
+        <p:cxnSp>
+          <p:nvCxnSpPr>
+            <p:cNvPr id="93" name="Straight Arrow Connector 92">
+              <a:extLst>
+                <a:ext uri="{FF2B5EF4-FFF2-40B4-BE49-F238E27FC236}">
+                  <a16:creationId xmlns:a16="http://schemas.microsoft.com/office/drawing/2014/main" id="{9C0DF8A3-BFF5-F51B-A1B8-6F25FB0EA814}"/>
+                </a:ext>
+              </a:extLst>
+            </p:cNvPr>
+            <p:cNvCxnSpPr>
+              <a:cxnSpLocks/>
+            </p:cNvCxnSpPr>
+            <p:nvPr/>
+          </p:nvCxnSpPr>
+          <p:spPr>
+            <a:xfrm>
+              <a:off x="5887406" y="3485305"/>
+              <a:ext cx="1782736" cy="0"/>
+            </a:xfrm>
+            <a:prstGeom prst="straightConnector1">
+              <a:avLst/>
+            </a:prstGeom>
+            <a:ln w="317500">
+              <a:solidFill>
+                <a:schemeClr val="accent1">
+                  <a:lumMod val="40000"/>
+                  <a:lumOff val="60000"/>
+                </a:schemeClr>
+              </a:solidFill>
+              <a:tailEnd type="stealth"/>
+            </a:ln>
+          </p:spPr>
+          <p:style>
+            <a:lnRef idx="2">
+              <a:schemeClr val="accent1"/>
+            </a:lnRef>
+            <a:fillRef idx="0">
+              <a:schemeClr val="accent1"/>
+            </a:fillRef>
+            <a:effectRef idx="1">
+              <a:schemeClr val="accent1"/>
+            </a:effectRef>
+            <a:fontRef idx="minor">
+              <a:schemeClr val="tx1"/>
+            </a:fontRef>
+          </p:style>
+        </p:cxnSp>
+        <p:cxnSp>
+          <p:nvCxnSpPr>
+            <p:cNvPr id="94" name="Straight Arrow Connector 93">
+              <a:extLst>
+                <a:ext uri="{FF2B5EF4-FFF2-40B4-BE49-F238E27FC236}">
+                  <a16:creationId xmlns:a16="http://schemas.microsoft.com/office/drawing/2014/main" id="{1A84B1AE-A0E2-4B49-E474-9C52BD5330AD}"/>
+                </a:ext>
+              </a:extLst>
+            </p:cNvPr>
+            <p:cNvCxnSpPr>
+              <a:cxnSpLocks/>
+            </p:cNvCxnSpPr>
+            <p:nvPr/>
+          </p:nvCxnSpPr>
+          <p:spPr>
+            <a:xfrm flipV="1">
+              <a:off x="5854748" y="3319097"/>
+              <a:ext cx="0" cy="1591188"/>
+            </a:xfrm>
+            <a:prstGeom prst="straightConnector1">
+              <a:avLst/>
+            </a:prstGeom>
+            <a:ln w="317500">
+              <a:solidFill>
+                <a:schemeClr val="accent1">
+                  <a:lumMod val="40000"/>
+                  <a:lumOff val="60000"/>
+                </a:schemeClr>
+              </a:solidFill>
+              <a:tailEnd type="none"/>
+            </a:ln>
+          </p:spPr>
+          <p:style>
+            <a:lnRef idx="2">
+              <a:schemeClr val="accent1"/>
+            </a:lnRef>
+            <a:fillRef idx="0">
+              <a:schemeClr val="accent1"/>
+            </a:fillRef>
+            <a:effectRef idx="1">
+              <a:schemeClr val="accent1"/>
+            </a:effectRef>
+            <a:fontRef idx="minor">
+              <a:schemeClr val="tx1"/>
+            </a:fontRef>
+          </p:style>
+        </p:cxnSp>
+        <p:grpSp>
+          <p:nvGrpSpPr>
+            <p:cNvPr id="95" name="Group 94">
+              <a:extLst>
+                <a:ext uri="{FF2B5EF4-FFF2-40B4-BE49-F238E27FC236}">
+                  <a16:creationId xmlns:a16="http://schemas.microsoft.com/office/drawing/2014/main" id="{8233B7D2-46C3-6553-DEAC-54AD613793DB}"/>
+                </a:ext>
+              </a:extLst>
+            </p:cNvPr>
+            <p:cNvGrpSpPr/>
+            <p:nvPr/>
+          </p:nvGrpSpPr>
+          <p:grpSpPr>
+            <a:xfrm flipV="1">
+              <a:off x="5778298" y="3421330"/>
+              <a:ext cx="1559962" cy="1662300"/>
+              <a:chOff x="5881816" y="226390"/>
+              <a:chExt cx="1559962" cy="1662300"/>
+            </a:xfrm>
+          </p:grpSpPr>
+          <p:cxnSp>
+            <p:nvCxnSpPr>
+              <p:cNvPr id="104" name="Straight Connector 103">
+                <a:extLst>
+                  <a:ext uri="{FF2B5EF4-FFF2-40B4-BE49-F238E27FC236}">
+                    <a16:creationId xmlns:a16="http://schemas.microsoft.com/office/drawing/2014/main" id="{5110C369-FFFF-C841-6E29-367FBFEA86EE}"/>
+                  </a:ext>
+                </a:extLst>
+              </p:cNvPr>
+              <p:cNvCxnSpPr>
+                <a:cxnSpLocks/>
+              </p:cNvCxnSpPr>
+              <p:nvPr/>
+            </p:nvCxnSpPr>
+            <p:spPr>
+              <a:xfrm flipV="1">
+                <a:off x="5881816" y="1880047"/>
+                <a:ext cx="1559962" cy="0"/>
+              </a:xfrm>
+              <a:prstGeom prst="line">
+                <a:avLst/>
+              </a:prstGeom>
+              <a:ln w="47625">
+                <a:solidFill>
+                  <a:srgbClr val="FF0000"/>
+                </a:solidFill>
+                <a:tailEnd type="triangle"/>
+              </a:ln>
+            </p:spPr>
+            <p:style>
+              <a:lnRef idx="2">
+                <a:schemeClr val="accent1"/>
+              </a:lnRef>
+              <a:fillRef idx="0">
+                <a:schemeClr val="accent1"/>
+              </a:fillRef>
+              <a:effectRef idx="1">
+                <a:schemeClr val="accent1"/>
+              </a:effectRef>
+              <a:fontRef idx="minor">
+                <a:schemeClr val="tx1"/>
+              </a:fontRef>
+            </p:style>
+          </p:cxnSp>
+          <p:cxnSp>
+            <p:nvCxnSpPr>
+              <p:cNvPr id="105" name="Straight Connector 104">
+                <a:extLst>
+                  <a:ext uri="{FF2B5EF4-FFF2-40B4-BE49-F238E27FC236}">
+                    <a16:creationId xmlns:a16="http://schemas.microsoft.com/office/drawing/2014/main" id="{676FCA77-C82E-DF1B-8D0A-3D9161C81599}"/>
+                  </a:ext>
+                </a:extLst>
+              </p:cNvPr>
+              <p:cNvCxnSpPr>
+                <a:cxnSpLocks/>
+              </p:cNvCxnSpPr>
+              <p:nvPr/>
+            </p:nvCxnSpPr>
+            <p:spPr>
+              <a:xfrm flipV="1">
+                <a:off x="5898292" y="226390"/>
+                <a:ext cx="0" cy="1662300"/>
+              </a:xfrm>
+              <a:prstGeom prst="line">
+                <a:avLst/>
+              </a:prstGeom>
+              <a:ln w="47625">
+                <a:solidFill>
+                  <a:srgbClr val="FF0000"/>
+                </a:solidFill>
+                <a:tailEnd type="none"/>
+              </a:ln>
+            </p:spPr>
+            <p:style>
+              <a:lnRef idx="2">
+                <a:schemeClr val="accent1"/>
+              </a:lnRef>
+              <a:fillRef idx="0">
+                <a:schemeClr val="accent1"/>
+              </a:fillRef>
+              <a:effectRef idx="1">
+                <a:schemeClr val="accent1"/>
+              </a:effectRef>
+              <a:fontRef idx="minor">
+                <a:schemeClr val="tx1"/>
+              </a:fontRef>
+            </p:style>
+          </p:cxnSp>
+        </p:grpSp>
+        <p:grpSp>
+          <p:nvGrpSpPr>
+            <p:cNvPr id="96" name="Group 95">
+              <a:extLst>
+                <a:ext uri="{FF2B5EF4-FFF2-40B4-BE49-F238E27FC236}">
+                  <a16:creationId xmlns:a16="http://schemas.microsoft.com/office/drawing/2014/main" id="{408CF0AE-2F91-D0CA-57DE-FCB9DF9482CC}"/>
+                </a:ext>
+              </a:extLst>
+            </p:cNvPr>
+            <p:cNvGrpSpPr/>
+            <p:nvPr/>
+          </p:nvGrpSpPr>
+          <p:grpSpPr>
+            <a:xfrm flipV="1">
+              <a:off x="5887406" y="3539733"/>
+              <a:ext cx="1450854" cy="1543897"/>
+              <a:chOff x="5881816" y="344793"/>
+              <a:chExt cx="1450854" cy="1543897"/>
+            </a:xfrm>
+          </p:grpSpPr>
+          <p:cxnSp>
+            <p:nvCxnSpPr>
+              <p:cNvPr id="102" name="Straight Connector 101">
+                <a:extLst>
+                  <a:ext uri="{FF2B5EF4-FFF2-40B4-BE49-F238E27FC236}">
+                    <a16:creationId xmlns:a16="http://schemas.microsoft.com/office/drawing/2014/main" id="{09C321EB-1E73-8DB6-1CCC-34F6A475101B}"/>
+                  </a:ext>
+                </a:extLst>
+              </p:cNvPr>
+              <p:cNvCxnSpPr>
+                <a:cxnSpLocks/>
+              </p:cNvCxnSpPr>
+              <p:nvPr/>
+            </p:nvCxnSpPr>
+            <p:spPr>
+              <a:xfrm flipV="1">
+                <a:off x="5881816" y="1880047"/>
+                <a:ext cx="1450854" cy="0"/>
+              </a:xfrm>
+              <a:prstGeom prst="line">
+                <a:avLst/>
+              </a:prstGeom>
+              <a:ln w="47625">
+                <a:solidFill>
+                  <a:srgbClr val="FF0000"/>
+                </a:solidFill>
+                <a:tailEnd type="triangle"/>
+              </a:ln>
+            </p:spPr>
+            <p:style>
+              <a:lnRef idx="2">
+                <a:schemeClr val="accent1"/>
+              </a:lnRef>
+              <a:fillRef idx="0">
+                <a:schemeClr val="accent1"/>
+              </a:fillRef>
+              <a:effectRef idx="1">
+                <a:schemeClr val="accent1"/>
+              </a:effectRef>
+              <a:fontRef idx="minor">
+                <a:schemeClr val="tx1"/>
+              </a:fontRef>
+            </p:style>
+          </p:cxnSp>
+          <p:cxnSp>
+            <p:nvCxnSpPr>
+              <p:cNvPr id="103" name="Straight Connector 102">
+                <a:extLst>
+                  <a:ext uri="{FF2B5EF4-FFF2-40B4-BE49-F238E27FC236}">
+                    <a16:creationId xmlns:a16="http://schemas.microsoft.com/office/drawing/2014/main" id="{C3A7DA43-DDE4-E2FA-CA67-652D773CFD5A}"/>
+                  </a:ext>
+                </a:extLst>
+              </p:cNvPr>
+              <p:cNvCxnSpPr>
+                <a:cxnSpLocks/>
+              </p:cNvCxnSpPr>
+              <p:nvPr/>
+            </p:nvCxnSpPr>
+            <p:spPr>
+              <a:xfrm flipV="1">
+                <a:off x="5898292" y="344793"/>
+                <a:ext cx="0" cy="1543897"/>
+              </a:xfrm>
+              <a:prstGeom prst="line">
+                <a:avLst/>
+              </a:prstGeom>
+              <a:ln w="47625">
+                <a:solidFill>
+                  <a:srgbClr val="FF0000"/>
+                </a:solidFill>
+                <a:tailEnd type="none"/>
+              </a:ln>
+            </p:spPr>
+            <p:style>
+              <a:lnRef idx="2">
+                <a:schemeClr val="accent1"/>
+              </a:lnRef>
+              <a:fillRef idx="0">
+                <a:schemeClr val="accent1"/>
+              </a:fillRef>
+              <a:effectRef idx="1">
+                <a:schemeClr val="accent1"/>
+              </a:effectRef>
+              <a:fontRef idx="minor">
+                <a:schemeClr val="tx1"/>
+              </a:fontRef>
+            </p:style>
+          </p:cxnSp>
+        </p:grpSp>
+        <p:cxnSp>
+          <p:nvCxnSpPr>
+            <p:cNvPr id="97" name="Straight Arrow Connector 96">
+              <a:extLst>
+                <a:ext uri="{FF2B5EF4-FFF2-40B4-BE49-F238E27FC236}">
+                  <a16:creationId xmlns:a16="http://schemas.microsoft.com/office/drawing/2014/main" id="{B8F5E592-6E4D-0C84-D02B-57F257FCC480}"/>
+                </a:ext>
+              </a:extLst>
+            </p:cNvPr>
+            <p:cNvCxnSpPr>
+              <a:cxnSpLocks/>
+            </p:cNvCxnSpPr>
+            <p:nvPr/>
+          </p:nvCxnSpPr>
+          <p:spPr>
+            <a:xfrm>
+              <a:off x="3690255" y="2510144"/>
+              <a:ext cx="3947227" cy="0"/>
+            </a:xfrm>
+            <a:prstGeom prst="straightConnector1">
+              <a:avLst/>
+            </a:prstGeom>
+            <a:ln w="317500">
+              <a:solidFill>
+                <a:schemeClr val="accent1">
+                  <a:lumMod val="40000"/>
+                  <a:lumOff val="60000"/>
+                </a:schemeClr>
+              </a:solidFill>
+              <a:tailEnd type="stealth"/>
+            </a:ln>
+          </p:spPr>
+          <p:style>
+            <a:lnRef idx="2">
+              <a:schemeClr val="accent1"/>
+            </a:lnRef>
+            <a:fillRef idx="0">
+              <a:schemeClr val="accent1"/>
+            </a:fillRef>
+            <a:effectRef idx="1">
+              <a:schemeClr val="accent1"/>
+            </a:effectRef>
+            <a:fontRef idx="minor">
+              <a:schemeClr val="tx1"/>
+            </a:fontRef>
+          </p:style>
+        </p:cxnSp>
+        <p:cxnSp>
+          <p:nvCxnSpPr>
+            <p:cNvPr id="98" name="Straight Arrow Connector 97">
+              <a:extLst>
+                <a:ext uri="{FF2B5EF4-FFF2-40B4-BE49-F238E27FC236}">
+                  <a16:creationId xmlns:a16="http://schemas.microsoft.com/office/drawing/2014/main" id="{F22B2E6D-535B-9EDD-C563-7ADAD94C1E53}"/>
+                </a:ext>
+              </a:extLst>
+            </p:cNvPr>
+            <p:cNvCxnSpPr>
+              <a:cxnSpLocks/>
+            </p:cNvCxnSpPr>
+            <p:nvPr/>
+          </p:nvCxnSpPr>
+          <p:spPr>
+            <a:xfrm>
+              <a:off x="5794778" y="1880047"/>
+              <a:ext cx="1782736" cy="0"/>
+            </a:xfrm>
+            <a:prstGeom prst="straightConnector1">
+              <a:avLst/>
+            </a:prstGeom>
+            <a:ln w="317500">
+              <a:solidFill>
+                <a:schemeClr val="accent1">
+                  <a:lumMod val="40000"/>
+                  <a:lumOff val="60000"/>
+                </a:schemeClr>
+              </a:solidFill>
+              <a:tailEnd type="stealth"/>
+            </a:ln>
+          </p:spPr>
+          <p:style>
+            <a:lnRef idx="2">
+              <a:schemeClr val="accent1"/>
+            </a:lnRef>
+            <a:fillRef idx="0">
+              <a:schemeClr val="accent1"/>
+            </a:fillRef>
+            <a:effectRef idx="1">
+              <a:schemeClr val="accent1"/>
+            </a:effectRef>
+            <a:fontRef idx="minor">
+              <a:schemeClr val="tx1"/>
+            </a:fontRef>
+          </p:style>
+        </p:cxnSp>
+        <p:cxnSp>
+          <p:nvCxnSpPr>
+            <p:cNvPr id="99" name="Straight Connector 98">
+              <a:extLst>
+                <a:ext uri="{FF2B5EF4-FFF2-40B4-BE49-F238E27FC236}">
+                  <a16:creationId xmlns:a16="http://schemas.microsoft.com/office/drawing/2014/main" id="{33B92881-B437-5C10-27E1-ADC92536D716}"/>
+                </a:ext>
+              </a:extLst>
+            </p:cNvPr>
+            <p:cNvCxnSpPr>
+              <a:cxnSpLocks/>
+            </p:cNvCxnSpPr>
+            <p:nvPr/>
+          </p:nvCxnSpPr>
+          <p:spPr>
+            <a:xfrm>
+              <a:off x="5914768" y="1880047"/>
+              <a:ext cx="1483214" cy="0"/>
+            </a:xfrm>
+            <a:prstGeom prst="line">
+              <a:avLst/>
+            </a:prstGeom>
+            <a:ln w="47625">
+              <a:solidFill>
+                <a:srgbClr val="FF0000"/>
+              </a:solidFill>
+              <a:tailEnd type="triangle"/>
+            </a:ln>
+          </p:spPr>
+          <p:style>
+            <a:lnRef idx="2">
+              <a:schemeClr val="accent1"/>
+            </a:lnRef>
+            <a:fillRef idx="0">
+              <a:schemeClr val="accent1"/>
+            </a:fillRef>
+            <a:effectRef idx="1">
+              <a:schemeClr val="accent1"/>
+            </a:effectRef>
+            <a:fontRef idx="minor">
+              <a:schemeClr val="tx1"/>
+            </a:fontRef>
+          </p:style>
+        </p:cxnSp>
+        <p:cxnSp>
+          <p:nvCxnSpPr>
+            <p:cNvPr id="100" name="Straight Arrow Connector 99">
+              <a:extLst>
+                <a:ext uri="{FF2B5EF4-FFF2-40B4-BE49-F238E27FC236}">
+                  <a16:creationId xmlns:a16="http://schemas.microsoft.com/office/drawing/2014/main" id="{8E22024C-9900-D20C-9F4D-43DE521682A4}"/>
+                </a:ext>
+              </a:extLst>
+            </p:cNvPr>
+            <p:cNvCxnSpPr>
+              <a:cxnSpLocks/>
+            </p:cNvCxnSpPr>
+            <p:nvPr/>
+          </p:nvCxnSpPr>
+          <p:spPr>
+            <a:xfrm flipV="1">
+              <a:off x="5951003" y="1079561"/>
+              <a:ext cx="0" cy="668817"/>
+            </a:xfrm>
+            <a:prstGeom prst="straightConnector1">
+              <a:avLst/>
+            </a:prstGeom>
+            <a:ln w="317500">
+              <a:solidFill>
+                <a:schemeClr val="accent1">
+                  <a:lumMod val="40000"/>
+                  <a:lumOff val="60000"/>
+                </a:schemeClr>
+              </a:solidFill>
+              <a:tailEnd type="none"/>
+            </a:ln>
+          </p:spPr>
+          <p:style>
+            <a:lnRef idx="2">
+              <a:schemeClr val="accent1"/>
+            </a:lnRef>
+            <a:fillRef idx="0">
+              <a:schemeClr val="accent1"/>
+            </a:fillRef>
+            <a:effectRef idx="1">
+              <a:schemeClr val="accent1"/>
+            </a:effectRef>
+            <a:fontRef idx="minor">
+              <a:schemeClr val="tx1"/>
+            </a:fontRef>
+          </p:style>
+        </p:cxnSp>
+        <p:cxnSp>
+          <p:nvCxnSpPr>
+            <p:cNvPr id="101" name="Straight Connector 100">
+              <a:extLst>
+                <a:ext uri="{FF2B5EF4-FFF2-40B4-BE49-F238E27FC236}">
+                  <a16:creationId xmlns:a16="http://schemas.microsoft.com/office/drawing/2014/main" id="{8D512CD2-DAE8-C51C-0437-533B2BA269F4}"/>
+                </a:ext>
+              </a:extLst>
+            </p:cNvPr>
+            <p:cNvCxnSpPr>
+              <a:cxnSpLocks/>
+            </p:cNvCxnSpPr>
+            <p:nvPr/>
+          </p:nvCxnSpPr>
+          <p:spPr>
+            <a:xfrm flipV="1">
+              <a:off x="5898292" y="844783"/>
+              <a:ext cx="0" cy="1043907"/>
+            </a:xfrm>
+            <a:prstGeom prst="line">
+              <a:avLst/>
+            </a:prstGeom>
+            <a:ln w="47625">
+              <a:solidFill>
+                <a:srgbClr val="FF0000"/>
+              </a:solidFill>
+              <a:tailEnd type="none"/>
+            </a:ln>
+          </p:spPr>
+          <p:style>
+            <a:lnRef idx="2">
+              <a:schemeClr val="accent1"/>
+            </a:lnRef>
+            <a:fillRef idx="0">
+              <a:schemeClr val="accent1"/>
+            </a:fillRef>
+            <a:effectRef idx="1">
+              <a:schemeClr val="accent1"/>
+            </a:effectRef>
+            <a:fontRef idx="minor">
+              <a:schemeClr val="tx1"/>
+            </a:fontRef>
+          </p:style>
+        </p:cxnSp>
+      </p:grpSp>
+      <p:sp>
+        <p:nvSpPr>
+          <p:cNvPr id="106" name="TextBox 105">
+            <a:extLst>
+              <a:ext uri="{FF2B5EF4-FFF2-40B4-BE49-F238E27FC236}">
+                <a16:creationId xmlns:a16="http://schemas.microsoft.com/office/drawing/2014/main" id="{2B6B4F06-9058-15ED-F52B-0C8FDA0068CF}"/>
+              </a:ext>
+            </a:extLst>
+          </p:cNvPr>
+          <p:cNvSpPr txBox="1"/>
+          <p:nvPr/>
+        </p:nvSpPr>
+        <p:spPr>
+          <a:xfrm>
+            <a:off x="2087093" y="5208123"/>
+            <a:ext cx="3408497" cy="369332"/>
+          </a:xfrm>
+          <a:prstGeom prst="rect">
+            <a:avLst/>
+          </a:prstGeom>
+          <a:noFill/>
+        </p:spPr>
+        <p:txBody>
+          <a:bodyPr wrap="none" rtlCol="0">
+            <a:spAutoFit/>
+          </a:bodyPr>
+          <a:lstStyle/>
+          <a:p>
+            <a:r>
+              <a:rPr lang="en-US"/>
+              <a:t>(a) Map flows through interfaces </a:t>
+            </a:r>
+          </a:p>
+        </p:txBody>
+      </p:sp>
+      <p:cxnSp>
+        <p:nvCxnSpPr>
+          <p:cNvPr id="107" name="Straight Connector 106">
+            <a:extLst>
+              <a:ext uri="{FF2B5EF4-FFF2-40B4-BE49-F238E27FC236}">
+                <a16:creationId xmlns:a16="http://schemas.microsoft.com/office/drawing/2014/main" id="{354D2F30-847F-826F-F113-387CCB911405}"/>
+              </a:ext>
+            </a:extLst>
+          </p:cNvPr>
+          <p:cNvCxnSpPr>
+            <a:cxnSpLocks/>
+          </p:cNvCxnSpPr>
+          <p:nvPr/>
+        </p:nvCxnSpPr>
+        <p:spPr>
+          <a:xfrm>
+            <a:off x="6770914" y="2434338"/>
+            <a:ext cx="3871012" cy="0"/>
+          </a:xfrm>
+          <a:prstGeom prst="line">
+            <a:avLst/>
+          </a:prstGeom>
+          <a:ln w="47625">
+            <a:solidFill>
+              <a:srgbClr val="FF0000"/>
+            </a:solidFill>
+            <a:tailEnd type="triangle"/>
+          </a:ln>
+        </p:spPr>
+        <p:style>
+          <a:lnRef idx="2">
+            <a:schemeClr val="accent1"/>
+          </a:lnRef>
+          <a:fillRef idx="0">
+            <a:schemeClr val="accent1"/>
+          </a:fillRef>
+          <a:effectRef idx="1">
+            <a:schemeClr val="accent1"/>
+          </a:effectRef>
+          <a:fontRef idx="minor">
+            <a:schemeClr val="tx1"/>
+          </a:fontRef>
+        </p:style>
+      </p:cxnSp>
+      <p:cxnSp>
+        <p:nvCxnSpPr>
+          <p:cNvPr id="108" name="Straight Connector 107">
+            <a:extLst>
+              <a:ext uri="{FF2B5EF4-FFF2-40B4-BE49-F238E27FC236}">
+                <a16:creationId xmlns:a16="http://schemas.microsoft.com/office/drawing/2014/main" id="{901753DD-117E-A4FD-3C30-A7B17E8A574C}"/>
+              </a:ext>
+            </a:extLst>
+          </p:cNvPr>
+          <p:cNvCxnSpPr>
+            <a:cxnSpLocks/>
+          </p:cNvCxnSpPr>
+          <p:nvPr/>
+        </p:nvCxnSpPr>
+        <p:spPr>
+          <a:xfrm>
+            <a:off x="6770914" y="2575261"/>
+            <a:ext cx="3871012" cy="0"/>
+          </a:xfrm>
+          <a:prstGeom prst="line">
+            <a:avLst/>
+          </a:prstGeom>
+          <a:ln w="47625">
+            <a:solidFill>
+              <a:srgbClr val="FF0000"/>
+            </a:solidFill>
+            <a:tailEnd type="triangle"/>
+          </a:ln>
+        </p:spPr>
+        <p:style>
+          <a:lnRef idx="2">
+            <a:schemeClr val="accent1"/>
+          </a:lnRef>
+          <a:fillRef idx="0">
+            <a:schemeClr val="accent1"/>
+          </a:fillRef>
+          <a:effectRef idx="1">
+            <a:schemeClr val="accent1"/>
+          </a:effectRef>
+          <a:fontRef idx="minor">
+            <a:schemeClr val="tx1"/>
+          </a:fontRef>
+        </p:style>
+      </p:cxnSp>
+      <p:sp>
+        <p:nvSpPr>
+          <p:cNvPr id="113" name="TextBox 112">
+            <a:extLst>
+              <a:ext uri="{FF2B5EF4-FFF2-40B4-BE49-F238E27FC236}">
+                <a16:creationId xmlns:a16="http://schemas.microsoft.com/office/drawing/2014/main" id="{C674D2BB-4E1F-84F1-1509-9FB256318DC3}"/>
+              </a:ext>
+            </a:extLst>
+          </p:cNvPr>
+          <p:cNvSpPr txBox="1"/>
+          <p:nvPr/>
+        </p:nvSpPr>
+        <p:spPr>
+          <a:xfrm>
+            <a:off x="6497226" y="5193717"/>
+            <a:ext cx="5330498" cy="369332"/>
+          </a:xfrm>
+          <a:prstGeom prst="rect">
+            <a:avLst/>
+          </a:prstGeom>
+          <a:noFill/>
+        </p:spPr>
+        <p:txBody>
+          <a:bodyPr wrap="none" rtlCol="0">
+            <a:spAutoFit/>
+          </a:bodyPr>
+          <a:lstStyle/>
+          <a:p>
+            <a:r>
+              <a:rPr lang="en-US"/>
+              <a:t>(b) Set of flows from common ingress form ‘FlowSet’</a:t>
+            </a:r>
+          </a:p>
+        </p:txBody>
+      </p:sp>
+    </p:spTree>
+    <p:extLst>
+      <p:ext uri="{BB962C8B-B14F-4D97-AF65-F5344CB8AC3E}">
+        <p14:creationId xmlns:p14="http://schemas.microsoft.com/office/powerpoint/2010/main" val="3381482800"/>
+      </p:ext>
+    </p:extLst>
+  </p:cSld>
+  <p:clrMapOvr>
+    <a:masterClrMapping/>
+  </p:clrMapOvr>
+</p:sld>
+</file>
+
+<file path=ppt/slides/slide4.xml><?xml version="1.0" encoding="utf-8"?>
+<p:sld xmlns:a="http://schemas.openxmlformats.org/drawingml/2006/main" xmlns:r="http://schemas.openxmlformats.org/officeDocument/2006/relationships" xmlns:p="http://schemas.openxmlformats.org/presentationml/2006/main">
+  <p:cSld>
+    <p:spTree>
+      <p:nvGrpSpPr>
+        <p:cNvPr id="1" name="">
+          <a:extLst>
+            <a:ext uri="{FF2B5EF4-FFF2-40B4-BE49-F238E27FC236}">
+              <a16:creationId xmlns:a16="http://schemas.microsoft.com/office/drawing/2014/main" id="{5102CAEA-C82E-DDB2-D120-E026DAEE79C7}"/>
+            </a:ext>
+          </a:extLst>
+        </p:cNvPr>
+        <p:cNvGrpSpPr/>
+        <p:nvPr/>
+      </p:nvGrpSpPr>
+      <p:grpSpPr>
+        <a:xfrm>
+          <a:off x="0" y="0"/>
+          <a:ext cx="0" cy="0"/>
+          <a:chOff x="0" y="0"/>
+          <a:chExt cx="0" cy="0"/>
+        </a:xfrm>
+      </p:grpSpPr>
+      <p:cxnSp>
+        <p:nvCxnSpPr>
+          <p:cNvPr id="38" name="Straight Connector 37">
+            <a:extLst>
+              <a:ext uri="{FF2B5EF4-FFF2-40B4-BE49-F238E27FC236}">
+                <a16:creationId xmlns:a16="http://schemas.microsoft.com/office/drawing/2014/main" id="{B347AB27-0579-9152-01DC-B9A2F7753546}"/>
+              </a:ext>
+            </a:extLst>
+          </p:cNvPr>
+          <p:cNvCxnSpPr>
+            <a:cxnSpLocks/>
+          </p:cNvCxnSpPr>
+          <p:nvPr/>
+        </p:nvCxnSpPr>
+        <p:spPr>
+          <a:xfrm>
+            <a:off x="3292820" y="2434338"/>
+            <a:ext cx="4039846" cy="0"/>
+          </a:xfrm>
+          <a:prstGeom prst="line">
+            <a:avLst/>
+          </a:prstGeom>
+          <a:ln w="47625">
+            <a:solidFill>
+              <a:srgbClr val="FF0000"/>
+            </a:solidFill>
+            <a:tailEnd type="triangle"/>
+          </a:ln>
+        </p:spPr>
+        <p:style>
+          <a:lnRef idx="2">
+            <a:schemeClr val="accent1"/>
+          </a:lnRef>
+          <a:fillRef idx="0">
+            <a:schemeClr val="accent1"/>
+          </a:fillRef>
+          <a:effectRef idx="1">
+            <a:schemeClr val="accent1"/>
+          </a:effectRef>
+          <a:fontRef idx="minor">
+            <a:schemeClr val="tx1"/>
+          </a:fontRef>
+        </p:style>
+      </p:cxnSp>
+      <p:cxnSp>
+        <p:nvCxnSpPr>
+          <p:cNvPr id="60" name="Straight Connector 59">
+            <a:extLst>
+              <a:ext uri="{FF2B5EF4-FFF2-40B4-BE49-F238E27FC236}">
+                <a16:creationId xmlns:a16="http://schemas.microsoft.com/office/drawing/2014/main" id="{1499AA64-E09C-EE5F-BA9E-D20BC97FA496}"/>
+              </a:ext>
+            </a:extLst>
+          </p:cNvPr>
+          <p:cNvCxnSpPr>
+            <a:cxnSpLocks/>
+          </p:cNvCxnSpPr>
+          <p:nvPr/>
+        </p:nvCxnSpPr>
+        <p:spPr>
+          <a:xfrm>
+            <a:off x="3292820" y="2575261"/>
+            <a:ext cx="4039846" cy="0"/>
+          </a:xfrm>
+          <a:prstGeom prst="line">
+            <a:avLst/>
+          </a:prstGeom>
+          <a:ln w="47625">
+            <a:solidFill>
+              <a:srgbClr val="FF0000"/>
+            </a:solidFill>
+            <a:tailEnd type="triangle"/>
+          </a:ln>
+        </p:spPr>
+        <p:style>
+          <a:lnRef idx="2">
+            <a:schemeClr val="accent1"/>
+          </a:lnRef>
+          <a:fillRef idx="0">
+            <a:schemeClr val="accent1"/>
+          </a:fillRef>
+          <a:effectRef idx="1">
+            <a:schemeClr val="accent1"/>
+          </a:effectRef>
+          <a:fontRef idx="minor">
+            <a:schemeClr val="tx1"/>
+          </a:fontRef>
+        </p:style>
+      </p:cxnSp>
+      <p:grpSp>
+        <p:nvGrpSpPr>
+          <p:cNvPr id="20" name="Group 19">
+            <a:extLst>
+              <a:ext uri="{FF2B5EF4-FFF2-40B4-BE49-F238E27FC236}">
+                <a16:creationId xmlns:a16="http://schemas.microsoft.com/office/drawing/2014/main" id="{DACEA345-5F82-4274-1738-FD9556D74984}"/>
+              </a:ext>
+            </a:extLst>
+          </p:cNvPr>
+          <p:cNvGrpSpPr/>
+          <p:nvPr/>
+        </p:nvGrpSpPr>
+        <p:grpSpPr>
+          <a:xfrm>
+            <a:off x="3690255" y="844783"/>
+            <a:ext cx="3979887" cy="4238847"/>
+            <a:chOff x="3690255" y="844783"/>
+            <a:chExt cx="3979887" cy="4238847"/>
+          </a:xfrm>
+        </p:grpSpPr>
+        <p:sp>
+          <p:nvSpPr>
+            <p:cNvPr id="21" name="Rectangle 20">
+              <a:extLst>
+                <a:ext uri="{FF2B5EF4-FFF2-40B4-BE49-F238E27FC236}">
+                  <a16:creationId xmlns:a16="http://schemas.microsoft.com/office/drawing/2014/main" id="{7819E028-A93C-365C-0C60-1C04CF56AF35}"/>
+                </a:ext>
+              </a:extLst>
+            </p:cNvPr>
+            <p:cNvSpPr/>
+            <p:nvPr/>
+          </p:nvSpPr>
+          <p:spPr>
+            <a:xfrm>
+              <a:off x="4158617" y="1248500"/>
+              <a:ext cx="3326453" cy="3074120"/>
+            </a:xfrm>
+            <a:prstGeom prst="rect">
+              <a:avLst/>
+            </a:prstGeom>
+            <a:solidFill>
+              <a:schemeClr val="bg1">
+                <a:lumMod val="85000"/>
+              </a:schemeClr>
+            </a:solidFill>
+          </p:spPr>
+          <p:style>
+            <a:lnRef idx="2">
+              <a:schemeClr val="accent1">
+                <a:shade val="15000"/>
+              </a:schemeClr>
+            </a:lnRef>
+            <a:fillRef idx="1">
+              <a:schemeClr val="accent1"/>
+            </a:fillRef>
+            <a:effectRef idx="0">
+              <a:schemeClr val="accent1"/>
+            </a:effectRef>
+            <a:fontRef idx="minor">
+              <a:schemeClr val="lt1"/>
+            </a:fontRef>
+          </p:style>
+          <p:txBody>
+            <a:bodyPr rtlCol="0" anchor="ctr"/>
+            <a:lstStyle/>
+            <a:p>
+              <a:pPr algn="ctr"/>
+              <a:endParaRPr lang="en-US"/>
+            </a:p>
+          </p:txBody>
+        </p:sp>
+        <p:sp>
+          <p:nvSpPr>
+            <p:cNvPr id="2" name="Rectangle 1">
+              <a:extLst>
+                <a:ext uri="{FF2B5EF4-FFF2-40B4-BE49-F238E27FC236}">
+                  <a16:creationId xmlns:a16="http://schemas.microsoft.com/office/drawing/2014/main" id="{61E8C594-3085-5881-BAE0-70A29AFFAF48}"/>
+                </a:ext>
+              </a:extLst>
+            </p:cNvPr>
+            <p:cNvSpPr/>
+            <p:nvPr/>
+          </p:nvSpPr>
+          <p:spPr>
+            <a:xfrm rot="5400000">
+              <a:off x="5654416" y="172714"/>
+              <a:ext cx="184888" cy="1998583"/>
+            </a:xfrm>
+            <a:prstGeom prst="rect">
+              <a:avLst/>
+            </a:prstGeom>
+            <a:solidFill>
+              <a:schemeClr val="accent3">
+                <a:lumMod val="40000"/>
+                <a:lumOff val="60000"/>
+              </a:schemeClr>
+            </a:solidFill>
+          </p:spPr>
+          <p:style>
+            <a:lnRef idx="2">
+              <a:schemeClr val="accent1">
+                <a:shade val="15000"/>
+              </a:schemeClr>
+            </a:lnRef>
+            <a:fillRef idx="1">
+              <a:schemeClr val="accent1"/>
+            </a:fillRef>
+            <a:effectRef idx="0">
+              <a:schemeClr val="accent1"/>
+            </a:effectRef>
+            <a:fontRef idx="minor">
+              <a:schemeClr val="lt1"/>
+            </a:fontRef>
+          </p:style>
+          <p:txBody>
+            <a:bodyPr rtlCol="0" anchor="ctr"/>
+            <a:lstStyle/>
+            <a:p>
+              <a:pPr algn="ctr"/>
+              <a:endParaRPr lang="en-US"/>
+            </a:p>
+          </p:txBody>
+        </p:sp>
+        <p:sp>
+          <p:nvSpPr>
+            <p:cNvPr id="5" name="Rectangle 4">
+              <a:extLst>
+                <a:ext uri="{FF2B5EF4-FFF2-40B4-BE49-F238E27FC236}">
+                  <a16:creationId xmlns:a16="http://schemas.microsoft.com/office/drawing/2014/main" id="{86061D94-F558-A7BF-D377-78E3AF9A7AEF}"/>
+                </a:ext>
+              </a:extLst>
+            </p:cNvPr>
+            <p:cNvSpPr/>
+            <p:nvPr/>
+          </p:nvSpPr>
+          <p:spPr>
+            <a:xfrm rot="5400000">
+              <a:off x="5729399" y="3415773"/>
+              <a:ext cx="184888" cy="1998583"/>
+            </a:xfrm>
+            <a:prstGeom prst="rect">
+              <a:avLst/>
+            </a:prstGeom>
+            <a:solidFill>
+              <a:schemeClr val="accent3">
+                <a:lumMod val="40000"/>
+                <a:lumOff val="60000"/>
+              </a:schemeClr>
+            </a:solidFill>
+          </p:spPr>
+          <p:style>
+            <a:lnRef idx="2">
+              <a:schemeClr val="accent1">
+                <a:shade val="15000"/>
+              </a:schemeClr>
+            </a:lnRef>
+            <a:fillRef idx="1">
+              <a:schemeClr val="accent1"/>
+            </a:fillRef>
+            <a:effectRef idx="0">
+              <a:schemeClr val="accent1"/>
+            </a:effectRef>
+            <a:fontRef idx="minor">
+              <a:schemeClr val="lt1"/>
+            </a:fontRef>
+          </p:style>
+          <p:txBody>
+            <a:bodyPr rtlCol="0" anchor="ctr"/>
+            <a:lstStyle/>
+            <a:p>
+              <a:pPr algn="ctr"/>
+              <a:endParaRPr lang="en-US"/>
+            </a:p>
+          </p:txBody>
+        </p:sp>
+        <p:sp>
+          <p:nvSpPr>
+            <p:cNvPr id="19" name="Rectangle 18">
+              <a:extLst>
+                <a:ext uri="{FF2B5EF4-FFF2-40B4-BE49-F238E27FC236}">
+                  <a16:creationId xmlns:a16="http://schemas.microsoft.com/office/drawing/2014/main" id="{8010AC0B-10AC-9570-85C8-4D1A9AA0291A}"/>
+                </a:ext>
+              </a:extLst>
+            </p:cNvPr>
+            <p:cNvSpPr/>
+            <p:nvPr/>
+          </p:nvSpPr>
+          <p:spPr>
+            <a:xfrm rot="10800000">
+              <a:off x="3968391" y="1707041"/>
+              <a:ext cx="184888" cy="1998583"/>
+            </a:xfrm>
+            <a:prstGeom prst="rect">
+              <a:avLst/>
+            </a:prstGeom>
+            <a:solidFill>
+              <a:schemeClr val="accent3">
+                <a:lumMod val="40000"/>
+                <a:lumOff val="60000"/>
+              </a:schemeClr>
+            </a:solidFill>
+          </p:spPr>
+          <p:style>
+            <a:lnRef idx="2">
+              <a:schemeClr val="accent1">
+                <a:shade val="15000"/>
+              </a:schemeClr>
+            </a:lnRef>
+            <a:fillRef idx="1">
+              <a:schemeClr val="accent1"/>
+            </a:fillRef>
+            <a:effectRef idx="0">
+              <a:schemeClr val="accent1"/>
+            </a:effectRef>
+            <a:fontRef idx="minor">
+              <a:schemeClr val="lt1"/>
+            </a:fontRef>
+          </p:style>
+          <p:txBody>
+            <a:bodyPr rtlCol="0" anchor="ctr"/>
+            <a:lstStyle/>
+            <a:p>
+              <a:pPr algn="ctr"/>
+              <a:endParaRPr lang="en-US"/>
+            </a:p>
+          </p:txBody>
+        </p:sp>
+        <p:sp>
+          <p:nvSpPr>
+            <p:cNvPr id="23" name="Rectangle 22">
+              <a:extLst>
+                <a:ext uri="{FF2B5EF4-FFF2-40B4-BE49-F238E27FC236}">
+                  <a16:creationId xmlns:a16="http://schemas.microsoft.com/office/drawing/2014/main" id="{0C08A90B-CC03-D4B3-9AE9-45636725B719}"/>
+                </a:ext>
+              </a:extLst>
+            </p:cNvPr>
+            <p:cNvSpPr/>
+            <p:nvPr/>
+          </p:nvSpPr>
+          <p:spPr>
+            <a:xfrm rot="10800000">
+              <a:off x="7485070" y="1707040"/>
+              <a:ext cx="184888" cy="1998583"/>
+            </a:xfrm>
+            <a:prstGeom prst="rect">
+              <a:avLst/>
+            </a:prstGeom>
+            <a:solidFill>
+              <a:schemeClr val="accent3">
+                <a:lumMod val="40000"/>
+                <a:lumOff val="60000"/>
+              </a:schemeClr>
+            </a:solidFill>
+          </p:spPr>
+          <p:style>
+            <a:lnRef idx="2">
+              <a:schemeClr val="accent1">
+                <a:shade val="15000"/>
+              </a:schemeClr>
+            </a:lnRef>
+            <a:fillRef idx="1">
+              <a:schemeClr val="accent1"/>
+            </a:fillRef>
+            <a:effectRef idx="0">
+              <a:schemeClr val="accent1"/>
+            </a:effectRef>
+            <a:fontRef idx="minor">
+              <a:schemeClr val="lt1"/>
+            </a:fontRef>
+          </p:style>
+          <p:txBody>
+            <a:bodyPr rtlCol="0" anchor="ctr"/>
+            <a:lstStyle/>
+            <a:p>
+              <a:pPr algn="ctr"/>
+              <a:endParaRPr lang="en-US"/>
+            </a:p>
+          </p:txBody>
+        </p:sp>
+        <p:cxnSp>
+          <p:nvCxnSpPr>
+            <p:cNvPr id="4" name="Straight Arrow Connector 3">
+              <a:extLst>
+                <a:ext uri="{FF2B5EF4-FFF2-40B4-BE49-F238E27FC236}">
+                  <a16:creationId xmlns:a16="http://schemas.microsoft.com/office/drawing/2014/main" id="{C012B934-13F1-2698-C533-2812B22AFFBC}"/>
+                </a:ext>
+              </a:extLst>
+            </p:cNvPr>
+            <p:cNvCxnSpPr>
+              <a:cxnSpLocks/>
+            </p:cNvCxnSpPr>
+            <p:nvPr/>
+          </p:nvCxnSpPr>
+          <p:spPr>
+            <a:xfrm>
+              <a:off x="5887406" y="3485305"/>
+              <a:ext cx="1782736" cy="0"/>
+            </a:xfrm>
+            <a:prstGeom prst="straightConnector1">
+              <a:avLst/>
+            </a:prstGeom>
+            <a:ln w="317500">
+              <a:solidFill>
+                <a:schemeClr val="accent1">
+                  <a:lumMod val="40000"/>
+                  <a:lumOff val="60000"/>
+                </a:schemeClr>
+              </a:solidFill>
+              <a:tailEnd type="stealth"/>
+            </a:ln>
+          </p:spPr>
+          <p:style>
+            <a:lnRef idx="2">
+              <a:schemeClr val="accent1"/>
+            </a:lnRef>
+            <a:fillRef idx="0">
+              <a:schemeClr val="accent1"/>
+            </a:fillRef>
+            <a:effectRef idx="1">
+              <a:schemeClr val="accent1"/>
+            </a:effectRef>
+            <a:fontRef idx="minor">
+              <a:schemeClr val="tx1"/>
+            </a:fontRef>
+          </p:style>
+        </p:cxnSp>
+        <p:cxnSp>
+          <p:nvCxnSpPr>
+            <p:cNvPr id="8" name="Straight Arrow Connector 7">
+              <a:extLst>
+                <a:ext uri="{FF2B5EF4-FFF2-40B4-BE49-F238E27FC236}">
+                  <a16:creationId xmlns:a16="http://schemas.microsoft.com/office/drawing/2014/main" id="{0FFFF4DF-2634-7F1F-A040-351ABA996D98}"/>
+                </a:ext>
+              </a:extLst>
+            </p:cNvPr>
+            <p:cNvCxnSpPr>
+              <a:cxnSpLocks/>
+            </p:cNvCxnSpPr>
+            <p:nvPr/>
+          </p:nvCxnSpPr>
+          <p:spPr>
+            <a:xfrm flipV="1">
+              <a:off x="5854748" y="3319097"/>
+              <a:ext cx="0" cy="1591188"/>
+            </a:xfrm>
+            <a:prstGeom prst="straightConnector1">
+              <a:avLst/>
+            </a:prstGeom>
+            <a:ln w="317500">
+              <a:solidFill>
+                <a:schemeClr val="accent1">
+                  <a:lumMod val="40000"/>
+                  <a:lumOff val="60000"/>
+                </a:schemeClr>
+              </a:solidFill>
+              <a:tailEnd type="none"/>
+            </a:ln>
+          </p:spPr>
+          <p:style>
+            <a:lnRef idx="2">
+              <a:schemeClr val="accent1"/>
+            </a:lnRef>
+            <a:fillRef idx="0">
+              <a:schemeClr val="accent1"/>
+            </a:fillRef>
+            <a:effectRef idx="1">
+              <a:schemeClr val="accent1"/>
+            </a:effectRef>
+            <a:fontRef idx="minor">
+              <a:schemeClr val="tx1"/>
+            </a:fontRef>
+          </p:style>
+        </p:cxnSp>
+        <p:grpSp>
+          <p:nvGrpSpPr>
+            <p:cNvPr id="71" name="Group 70">
+              <a:extLst>
+                <a:ext uri="{FF2B5EF4-FFF2-40B4-BE49-F238E27FC236}">
+                  <a16:creationId xmlns:a16="http://schemas.microsoft.com/office/drawing/2014/main" id="{288A4F07-FFCF-F114-7C91-05A806F5790E}"/>
+                </a:ext>
+              </a:extLst>
+            </p:cNvPr>
+            <p:cNvGrpSpPr/>
+            <p:nvPr/>
+          </p:nvGrpSpPr>
+          <p:grpSpPr>
+            <a:xfrm flipV="1">
+              <a:off x="5778298" y="3421330"/>
+              <a:ext cx="1559962" cy="1662300"/>
+              <a:chOff x="5881816" y="226390"/>
+              <a:chExt cx="1559962" cy="1662300"/>
+            </a:xfrm>
+          </p:grpSpPr>
+          <p:cxnSp>
+            <p:nvCxnSpPr>
+              <p:cNvPr id="72" name="Straight Connector 71">
+                <a:extLst>
+                  <a:ext uri="{FF2B5EF4-FFF2-40B4-BE49-F238E27FC236}">
+                    <a16:creationId xmlns:a16="http://schemas.microsoft.com/office/drawing/2014/main" id="{834E06D1-5DBB-A63F-21E0-BD4BE1629011}"/>
+                  </a:ext>
+                </a:extLst>
+              </p:cNvPr>
+              <p:cNvCxnSpPr>
+                <a:cxnSpLocks/>
+              </p:cNvCxnSpPr>
+              <p:nvPr/>
+            </p:nvCxnSpPr>
+            <p:spPr>
+              <a:xfrm flipV="1">
+                <a:off x="5881816" y="1880047"/>
+                <a:ext cx="1559962" cy="0"/>
+              </a:xfrm>
+              <a:prstGeom prst="line">
+                <a:avLst/>
+              </a:prstGeom>
+              <a:ln w="47625">
+                <a:solidFill>
+                  <a:srgbClr val="FF0000"/>
+                </a:solidFill>
+                <a:tailEnd type="triangle"/>
+              </a:ln>
+            </p:spPr>
+            <p:style>
+              <a:lnRef idx="2">
+                <a:schemeClr val="accent1"/>
+              </a:lnRef>
+              <a:fillRef idx="0">
+                <a:schemeClr val="accent1"/>
+              </a:fillRef>
+              <a:effectRef idx="1">
+                <a:schemeClr val="accent1"/>
+              </a:effectRef>
+              <a:fontRef idx="minor">
+                <a:schemeClr val="tx1"/>
+              </a:fontRef>
+            </p:style>
+          </p:cxnSp>
+          <p:cxnSp>
+            <p:nvCxnSpPr>
+              <p:cNvPr id="73" name="Straight Connector 72">
+                <a:extLst>
+                  <a:ext uri="{FF2B5EF4-FFF2-40B4-BE49-F238E27FC236}">
+                    <a16:creationId xmlns:a16="http://schemas.microsoft.com/office/drawing/2014/main" id="{295CC6F7-38E1-565E-9FB7-B124A1F62236}"/>
+                  </a:ext>
+                </a:extLst>
+              </p:cNvPr>
+              <p:cNvCxnSpPr>
+                <a:cxnSpLocks/>
+              </p:cNvCxnSpPr>
+              <p:nvPr/>
+            </p:nvCxnSpPr>
+            <p:spPr>
+              <a:xfrm flipV="1">
+                <a:off x="5898292" y="226390"/>
+                <a:ext cx="0" cy="1662300"/>
+              </a:xfrm>
+              <a:prstGeom prst="line">
+                <a:avLst/>
+              </a:prstGeom>
+              <a:ln w="47625">
+                <a:solidFill>
+                  <a:srgbClr val="FF0000"/>
+                </a:solidFill>
+                <a:tailEnd type="none"/>
+              </a:ln>
+            </p:spPr>
+            <p:style>
+              <a:lnRef idx="2">
+                <a:schemeClr val="accent1"/>
+              </a:lnRef>
+              <a:fillRef idx="0">
+                <a:schemeClr val="accent1"/>
+              </a:fillRef>
+              <a:effectRef idx="1">
+                <a:schemeClr val="accent1"/>
+              </a:effectRef>
+              <a:fontRef idx="minor">
+                <a:schemeClr val="tx1"/>
+              </a:fontRef>
+            </p:style>
+          </p:cxnSp>
+        </p:grpSp>
+        <p:grpSp>
+          <p:nvGrpSpPr>
+            <p:cNvPr id="75" name="Group 74">
+              <a:extLst>
+                <a:ext uri="{FF2B5EF4-FFF2-40B4-BE49-F238E27FC236}">
+                  <a16:creationId xmlns:a16="http://schemas.microsoft.com/office/drawing/2014/main" id="{4CE86771-8496-3769-5013-D444B496B363}"/>
+                </a:ext>
+              </a:extLst>
+            </p:cNvPr>
+            <p:cNvGrpSpPr/>
+            <p:nvPr/>
+          </p:nvGrpSpPr>
+          <p:grpSpPr>
+            <a:xfrm flipV="1">
+              <a:off x="5887406" y="3539733"/>
+              <a:ext cx="1450854" cy="1543897"/>
+              <a:chOff x="5881816" y="344793"/>
+              <a:chExt cx="1450854" cy="1543897"/>
+            </a:xfrm>
+          </p:grpSpPr>
+          <p:cxnSp>
+            <p:nvCxnSpPr>
+              <p:cNvPr id="76" name="Straight Connector 75">
+                <a:extLst>
+                  <a:ext uri="{FF2B5EF4-FFF2-40B4-BE49-F238E27FC236}">
+                    <a16:creationId xmlns:a16="http://schemas.microsoft.com/office/drawing/2014/main" id="{AA823826-06BE-E7DA-446D-604BB6C2B167}"/>
+                  </a:ext>
+                </a:extLst>
+              </p:cNvPr>
+              <p:cNvCxnSpPr>
+                <a:cxnSpLocks/>
+              </p:cNvCxnSpPr>
+              <p:nvPr/>
+            </p:nvCxnSpPr>
+            <p:spPr>
+              <a:xfrm flipV="1">
+                <a:off x="5881816" y="1880047"/>
+                <a:ext cx="1450854" cy="0"/>
+              </a:xfrm>
+              <a:prstGeom prst="line">
+                <a:avLst/>
+              </a:prstGeom>
+              <a:ln w="47625">
+                <a:solidFill>
+                  <a:srgbClr val="FF0000"/>
+                </a:solidFill>
+                <a:tailEnd type="triangle"/>
+              </a:ln>
+            </p:spPr>
+            <p:style>
+              <a:lnRef idx="2">
+                <a:schemeClr val="accent1"/>
+              </a:lnRef>
+              <a:fillRef idx="0">
+                <a:schemeClr val="accent1"/>
+              </a:fillRef>
+              <a:effectRef idx="1">
+                <a:schemeClr val="accent1"/>
+              </a:effectRef>
+              <a:fontRef idx="minor">
+                <a:schemeClr val="tx1"/>
+              </a:fontRef>
+            </p:style>
+          </p:cxnSp>
+          <p:cxnSp>
+            <p:nvCxnSpPr>
+              <p:cNvPr id="77" name="Straight Connector 76">
+                <a:extLst>
+                  <a:ext uri="{FF2B5EF4-FFF2-40B4-BE49-F238E27FC236}">
+                    <a16:creationId xmlns:a16="http://schemas.microsoft.com/office/drawing/2014/main" id="{B750DF2A-AC99-A4CC-640F-62186F36F5DE}"/>
+                  </a:ext>
+                </a:extLst>
+              </p:cNvPr>
+              <p:cNvCxnSpPr>
+                <a:cxnSpLocks/>
+              </p:cNvCxnSpPr>
+              <p:nvPr/>
+            </p:nvCxnSpPr>
+            <p:spPr>
+              <a:xfrm flipV="1">
+                <a:off x="5898292" y="344793"/>
+                <a:ext cx="0" cy="1543897"/>
+              </a:xfrm>
+              <a:prstGeom prst="line">
+                <a:avLst/>
+              </a:prstGeom>
+              <a:ln w="47625">
+                <a:solidFill>
+                  <a:srgbClr val="FF0000"/>
+                </a:solidFill>
+                <a:tailEnd type="none"/>
+              </a:ln>
+            </p:spPr>
+            <p:style>
+              <a:lnRef idx="2">
+                <a:schemeClr val="accent1"/>
+              </a:lnRef>
+              <a:fillRef idx="0">
+                <a:schemeClr val="accent1"/>
+              </a:fillRef>
+              <a:effectRef idx="1">
+                <a:schemeClr val="accent1"/>
+              </a:effectRef>
+              <a:fontRef idx="minor">
+                <a:schemeClr val="tx1"/>
+              </a:fontRef>
+            </p:style>
+          </p:cxnSp>
+        </p:grpSp>
+        <p:cxnSp>
+          <p:nvCxnSpPr>
+            <p:cNvPr id="10" name="Straight Arrow Connector 9">
+              <a:extLst>
+                <a:ext uri="{FF2B5EF4-FFF2-40B4-BE49-F238E27FC236}">
+                  <a16:creationId xmlns:a16="http://schemas.microsoft.com/office/drawing/2014/main" id="{83470595-4C87-15B3-A86C-5763E139ABD5}"/>
+                </a:ext>
+              </a:extLst>
+            </p:cNvPr>
+            <p:cNvCxnSpPr>
+              <a:cxnSpLocks/>
+            </p:cNvCxnSpPr>
+            <p:nvPr/>
+          </p:nvCxnSpPr>
+          <p:spPr>
+            <a:xfrm>
+              <a:off x="3690255" y="2510144"/>
+              <a:ext cx="3947227" cy="0"/>
+            </a:xfrm>
+            <a:prstGeom prst="straightConnector1">
+              <a:avLst/>
+            </a:prstGeom>
+            <a:ln w="317500">
+              <a:solidFill>
+                <a:schemeClr val="accent1">
+                  <a:lumMod val="40000"/>
+                  <a:lumOff val="60000"/>
+                </a:schemeClr>
+              </a:solidFill>
+              <a:tailEnd type="stealth"/>
+            </a:ln>
+          </p:spPr>
+          <p:style>
+            <a:lnRef idx="2">
+              <a:schemeClr val="accent1"/>
+            </a:lnRef>
+            <a:fillRef idx="0">
+              <a:schemeClr val="accent1"/>
+            </a:fillRef>
+            <a:effectRef idx="1">
+              <a:schemeClr val="accent1"/>
+            </a:effectRef>
+            <a:fontRef idx="minor">
+              <a:schemeClr val="tx1"/>
+            </a:fontRef>
+          </p:style>
+        </p:cxnSp>
+        <p:cxnSp>
+          <p:nvCxnSpPr>
+            <p:cNvPr id="14" name="Straight Arrow Connector 13">
+              <a:extLst>
+                <a:ext uri="{FF2B5EF4-FFF2-40B4-BE49-F238E27FC236}">
+                  <a16:creationId xmlns:a16="http://schemas.microsoft.com/office/drawing/2014/main" id="{88DC6F0A-C3E7-0E5F-9F01-B648733B7FAB}"/>
+                </a:ext>
+              </a:extLst>
+            </p:cNvPr>
+            <p:cNvCxnSpPr>
+              <a:cxnSpLocks/>
+            </p:cNvCxnSpPr>
+            <p:nvPr/>
+          </p:nvCxnSpPr>
+          <p:spPr>
+            <a:xfrm>
+              <a:off x="5794778" y="1880047"/>
+              <a:ext cx="1782736" cy="0"/>
+            </a:xfrm>
+            <a:prstGeom prst="straightConnector1">
+              <a:avLst/>
+            </a:prstGeom>
+            <a:ln w="317500">
+              <a:solidFill>
+                <a:schemeClr val="accent1">
+                  <a:lumMod val="40000"/>
+                  <a:lumOff val="60000"/>
+                </a:schemeClr>
+              </a:solidFill>
+              <a:tailEnd type="stealth"/>
+            </a:ln>
+          </p:spPr>
+          <p:style>
+            <a:lnRef idx="2">
+              <a:schemeClr val="accent1"/>
+            </a:lnRef>
+            <a:fillRef idx="0">
+              <a:schemeClr val="accent1"/>
+            </a:fillRef>
+            <a:effectRef idx="1">
+              <a:schemeClr val="accent1"/>
+            </a:effectRef>
+            <a:fontRef idx="minor">
+              <a:schemeClr val="tx1"/>
+            </a:fontRef>
+          </p:style>
+        </p:cxnSp>
+        <p:cxnSp>
+          <p:nvCxnSpPr>
+            <p:cNvPr id="62" name="Straight Connector 61">
+              <a:extLst>
+                <a:ext uri="{FF2B5EF4-FFF2-40B4-BE49-F238E27FC236}">
+                  <a16:creationId xmlns:a16="http://schemas.microsoft.com/office/drawing/2014/main" id="{5FD5C214-F0F3-5F03-2384-CD61C5F40121}"/>
+                </a:ext>
+              </a:extLst>
+            </p:cNvPr>
+            <p:cNvCxnSpPr>
+              <a:cxnSpLocks/>
+            </p:cNvCxnSpPr>
+            <p:nvPr/>
+          </p:nvCxnSpPr>
+          <p:spPr>
+            <a:xfrm>
+              <a:off x="5914768" y="1880047"/>
+              <a:ext cx="1483214" cy="0"/>
+            </a:xfrm>
+            <a:prstGeom prst="line">
+              <a:avLst/>
+            </a:prstGeom>
+            <a:ln w="47625">
+              <a:solidFill>
+                <a:srgbClr val="FF0000"/>
+              </a:solidFill>
+              <a:tailEnd type="triangle"/>
+            </a:ln>
+          </p:spPr>
+          <p:style>
+            <a:lnRef idx="2">
+              <a:schemeClr val="accent1"/>
+            </a:lnRef>
+            <a:fillRef idx="0">
+              <a:schemeClr val="accent1"/>
+            </a:fillRef>
+            <a:effectRef idx="1">
+              <a:schemeClr val="accent1"/>
+            </a:effectRef>
+            <a:fontRef idx="minor">
+              <a:schemeClr val="tx1"/>
+            </a:fontRef>
+          </p:style>
+        </p:cxnSp>
+        <p:cxnSp>
+          <p:nvCxnSpPr>
+            <p:cNvPr id="16" name="Straight Arrow Connector 15">
+              <a:extLst>
+                <a:ext uri="{FF2B5EF4-FFF2-40B4-BE49-F238E27FC236}">
+                  <a16:creationId xmlns:a16="http://schemas.microsoft.com/office/drawing/2014/main" id="{5415EC81-03F1-FBC8-BA55-2C52489CA70D}"/>
+                </a:ext>
+              </a:extLst>
+            </p:cNvPr>
+            <p:cNvCxnSpPr>
+              <a:cxnSpLocks/>
+            </p:cNvCxnSpPr>
+            <p:nvPr/>
+          </p:nvCxnSpPr>
+          <p:spPr>
+            <a:xfrm flipV="1">
+              <a:off x="5951003" y="1079561"/>
+              <a:ext cx="0" cy="668817"/>
+            </a:xfrm>
+            <a:prstGeom prst="straightConnector1">
+              <a:avLst/>
+            </a:prstGeom>
+            <a:ln w="317500">
+              <a:solidFill>
+                <a:schemeClr val="accent1">
+                  <a:lumMod val="40000"/>
+                  <a:lumOff val="60000"/>
+                </a:schemeClr>
+              </a:solidFill>
+              <a:tailEnd type="none"/>
+            </a:ln>
+          </p:spPr>
+          <p:style>
+            <a:lnRef idx="2">
+              <a:schemeClr val="accent1"/>
+            </a:lnRef>
+            <a:fillRef idx="0">
+              <a:schemeClr val="accent1"/>
+            </a:fillRef>
+            <a:effectRef idx="1">
+              <a:schemeClr val="accent1"/>
+            </a:effectRef>
+            <a:fontRef idx="minor">
+              <a:schemeClr val="tx1"/>
+            </a:fontRef>
+          </p:style>
+        </p:cxnSp>
+        <p:cxnSp>
+          <p:nvCxnSpPr>
+            <p:cNvPr id="68" name="Straight Connector 67">
+              <a:extLst>
+                <a:ext uri="{FF2B5EF4-FFF2-40B4-BE49-F238E27FC236}">
+                  <a16:creationId xmlns:a16="http://schemas.microsoft.com/office/drawing/2014/main" id="{44573E7B-CBAC-BFB5-053C-1D822D7DF8A5}"/>
+                </a:ext>
+              </a:extLst>
+            </p:cNvPr>
+            <p:cNvCxnSpPr>
+              <a:cxnSpLocks/>
+            </p:cNvCxnSpPr>
+            <p:nvPr/>
+          </p:nvCxnSpPr>
+          <p:spPr>
+            <a:xfrm flipV="1">
+              <a:off x="5898292" y="844783"/>
+              <a:ext cx="0" cy="1043907"/>
+            </a:xfrm>
+            <a:prstGeom prst="line">
+              <a:avLst/>
+            </a:prstGeom>
+            <a:ln w="47625">
+              <a:solidFill>
+                <a:srgbClr val="FF0000"/>
+              </a:solidFill>
+              <a:tailEnd type="none"/>
+            </a:ln>
+          </p:spPr>
+          <p:style>
+            <a:lnRef idx="2">
+              <a:schemeClr val="accent1"/>
+            </a:lnRef>
+            <a:fillRef idx="0">
+              <a:schemeClr val="accent1"/>
+            </a:fillRef>
+            <a:effectRef idx="1">
+              <a:schemeClr val="accent1"/>
+            </a:effectRef>
+            <a:fontRef idx="minor">
+              <a:schemeClr val="tx1"/>
+            </a:fontRef>
+          </p:style>
+        </p:cxnSp>
+      </p:grpSp>
+    </p:spTree>
+    <p:extLst>
+      <p:ext uri="{BB962C8B-B14F-4D97-AF65-F5344CB8AC3E}">
+        <p14:creationId xmlns:p14="http://schemas.microsoft.com/office/powerpoint/2010/main" val="3653363073"/>
+      </p:ext>
+    </p:extLst>
+  </p:cSld>
+  <p:clrMapOvr>
+    <a:masterClrMapping/>
+  </p:clrMapOvr>
+</p:sld>
+</file>
+
 <file path=ppt/theme/theme1.xml><?xml version="1.0" encoding="utf-8"?>
 <a:theme xmlns:a="http://schemas.openxmlformats.org/drawingml/2006/main" name="Office Theme">
   <a:themeElements>

</xml_diff>